<commit_message>
adding Greg's chart slides
adding Greg's chart slides
</commit_message>
<xml_diff>
--- a/PowerPoint/Digital Humanities.pptx
+++ b/PowerPoint/Digital Humanities.pptx
@@ -16,8 +16,10 @@
     <p:sldId id="264" r:id="rId10"/>
     <p:sldId id="267" r:id="rId11"/>
     <p:sldId id="263" r:id="rId12"/>
-    <p:sldId id="261" r:id="rId13"/>
-    <p:sldId id="262" r:id="rId14"/>
+    <p:sldId id="272" r:id="rId13"/>
+    <p:sldId id="273" r:id="rId14"/>
+    <p:sldId id="261" r:id="rId15"/>
+    <p:sldId id="271" r:id="rId16"/>
   </p:sldIdLst>
   <p:sldSz cx="12192000" cy="6858000"/>
   <p:notesSz cx="6858000" cy="9144000"/>
@@ -118,7 +120,7 @@
   </p:defaultTextStyle>
   <p:extLst>
     <p:ext uri="{EFAFB233-063F-42B5-8137-9DF3F51BA10A}">
-      <p15:sldGuideLst xmlns:p15="http://schemas.microsoft.com/office/powerpoint/2012/main" xmlns=""/>
+      <p15:sldGuideLst xmlns="" xmlns:p15="http://schemas.microsoft.com/office/powerpoint/2012/main"/>
     </p:ext>
   </p:extLst>
 </p:presentation>
@@ -391,11 +393,11 @@
         </c:dLbls>
         <c:gapWidth val="100"/>
         <c:overlap val="-24"/>
-        <c:axId val="65870848"/>
-        <c:axId val="52520064"/>
+        <c:axId val="124006400"/>
+        <c:axId val="94975616"/>
       </c:barChart>
       <c:catAx>
-        <c:axId val="65870848"/>
+        <c:axId val="124006400"/>
         <c:scaling>
           <c:orientation val="minMax"/>
         </c:scaling>
@@ -437,7 +439,7 @@
             <a:endParaRPr lang="en-US"/>
           </a:p>
         </c:txPr>
-        <c:crossAx val="52520064"/>
+        <c:crossAx val="94975616"/>
         <c:crosses val="autoZero"/>
         <c:auto val="1"/>
         <c:lblAlgn val="ctr"/>
@@ -445,7 +447,7 @@
         <c:noMultiLvlLbl val="0"/>
       </c:catAx>
       <c:valAx>
-        <c:axId val="52520064"/>
+        <c:axId val="94975616"/>
         <c:scaling>
           <c:orientation val="minMax"/>
         </c:scaling>
@@ -495,7 +497,7 @@
             <a:endParaRPr lang="en-US"/>
           </a:p>
         </c:txPr>
-        <c:crossAx val="65870848"/>
+        <c:crossAx val="124006400"/>
         <c:crosses val="autoZero"/>
         <c:crossBetween val="between"/>
       </c:valAx>
@@ -534,6 +536,1747 @@
     </a:gradFill>
     <a:ln>
       <a:noFill/>
+    </a:ln>
+    <a:effectLst/>
+  </c:spPr>
+  <c:txPr>
+    <a:bodyPr/>
+    <a:lstStyle/>
+    <a:p>
+      <a:pPr>
+        <a:defRPr/>
+      </a:pPr>
+      <a:endParaRPr lang="en-US"/>
+    </a:p>
+  </c:txPr>
+  <c:externalData r:id="rId1">
+    <c:autoUpdate val="0"/>
+  </c:externalData>
+</c:chartSpace>
+</file>
+
+<file path=ppt/charts/chart10.xml><?xml version="1.0" encoding="utf-8"?>
+<c:chartSpace xmlns:c="http://schemas.openxmlformats.org/drawingml/2006/chart" xmlns:a="http://schemas.openxmlformats.org/drawingml/2006/main" xmlns:r="http://schemas.openxmlformats.org/officeDocument/2006/relationships">
+  <c:date1904 val="0"/>
+  <c:lang val="en-US"/>
+  <c:roundedCorners val="0"/>
+  <mc:AlternateContent xmlns:mc="http://schemas.openxmlformats.org/markup-compatibility/2006">
+    <mc:Choice xmlns:c14="http://schemas.microsoft.com/office/drawing/2007/8/2/chart" Requires="c14">
+      <c14:style val="106"/>
+    </mc:Choice>
+    <mc:Fallback>
+      <c:style val="6"/>
+    </mc:Fallback>
+  </mc:AlternateContent>
+  <c:chart>
+    <c:title>
+      <c:layout/>
+      <c:overlay val="0"/>
+      <c:spPr>
+        <a:noFill/>
+        <a:ln>
+          <a:noFill/>
+        </a:ln>
+        <a:effectLst/>
+      </c:spPr>
+      <c:txPr>
+        <a:bodyPr rot="0" spcFirstLastPara="1" vertOverflow="ellipsis" vert="horz" wrap="square" anchor="ctr" anchorCtr="1"/>
+        <a:lstStyle/>
+        <a:p>
+          <a:pPr>
+            <a:defRPr sz="1600" b="1" i="0" u="none" strike="noStrike" kern="1200" spc="100" baseline="0">
+              <a:solidFill>
+                <a:schemeClr val="lt1">
+                  <a:lumMod val="95000"/>
+                </a:schemeClr>
+              </a:solidFill>
+              <a:effectLst>
+                <a:outerShdw blurRad="50800" dist="38100" dir="5400000" algn="t" rotWithShape="0">
+                  <a:prstClr val="black">
+                    <a:alpha val="40000"/>
+                  </a:prstClr>
+                </a:outerShdw>
+              </a:effectLst>
+              <a:latin typeface="+mn-lt"/>
+              <a:ea typeface="+mn-ea"/>
+              <a:cs typeface="+mn-cs"/>
+            </a:defRPr>
+          </a:pPr>
+          <a:endParaRPr lang="en-US"/>
+        </a:p>
+      </c:txPr>
+    </c:title>
+    <c:autoTitleDeleted val="0"/>
+    <c:plotArea>
+      <c:layout/>
+      <c:barChart>
+        <c:barDir val="col"/>
+        <c:grouping val="clustered"/>
+        <c:varyColors val="0"/>
+        <c:ser>
+          <c:idx val="0"/>
+          <c:order val="0"/>
+          <c:tx>
+            <c:strRef>
+              <c:f>'Greg''s tests'!$A$12</c:f>
+              <c:strCache>
+                <c:ptCount val="1"/>
+                <c:pt idx="0">
+                  <c:v>Levenshtein's Distance</c:v>
+                </c:pt>
+              </c:strCache>
+            </c:strRef>
+          </c:tx>
+          <c:spPr>
+            <a:gradFill rotWithShape="1">
+              <a:gsLst>
+                <a:gs pos="0">
+                  <a:schemeClr val="accent4">
+                    <a:shade val="51000"/>
+                    <a:satMod val="130000"/>
+                  </a:schemeClr>
+                </a:gs>
+                <a:gs pos="80000">
+                  <a:schemeClr val="accent4">
+                    <a:shade val="93000"/>
+                    <a:satMod val="130000"/>
+                  </a:schemeClr>
+                </a:gs>
+                <a:gs pos="100000">
+                  <a:schemeClr val="accent4">
+                    <a:shade val="94000"/>
+                    <a:satMod val="135000"/>
+                  </a:schemeClr>
+                </a:gs>
+              </a:gsLst>
+              <a:lin ang="16200000" scaled="0"/>
+            </a:gradFill>
+            <a:ln>
+              <a:noFill/>
+            </a:ln>
+            <a:effectLst>
+              <a:outerShdw blurRad="40000" dist="23000" dir="5400000" rotWithShape="0">
+                <a:srgbClr val="000000">
+                  <a:alpha val="35000"/>
+                </a:srgbClr>
+              </a:outerShdw>
+            </a:effectLst>
+            <a:scene3d>
+              <a:camera prst="orthographicFront">
+                <a:rot lat="0" lon="0" rev="0"/>
+              </a:camera>
+              <a:lightRig rig="threePt" dir="t">
+                <a:rot lat="0" lon="0" rev="1200000"/>
+              </a:lightRig>
+            </a:scene3d>
+            <a:sp3d>
+              <a:bevelT w="63500" h="25400"/>
+            </a:sp3d>
+          </c:spPr>
+          <c:invertIfNegative val="0"/>
+          <c:dPt>
+            <c:idx val="0"/>
+            <c:invertIfNegative val="0"/>
+            <c:bubble3D val="0"/>
+          </c:dPt>
+          <c:dPt>
+            <c:idx val="1"/>
+            <c:invertIfNegative val="0"/>
+            <c:bubble3D val="0"/>
+          </c:dPt>
+          <c:dPt>
+            <c:idx val="2"/>
+            <c:invertIfNegative val="0"/>
+            <c:bubble3D val="0"/>
+          </c:dPt>
+          <c:dPt>
+            <c:idx val="3"/>
+            <c:invertIfNegative val="0"/>
+            <c:bubble3D val="0"/>
+          </c:dPt>
+          <c:dPt>
+            <c:idx val="4"/>
+            <c:invertIfNegative val="0"/>
+            <c:bubble3D val="0"/>
+          </c:dPt>
+          <c:dPt>
+            <c:idx val="5"/>
+            <c:invertIfNegative val="0"/>
+            <c:bubble3D val="0"/>
+          </c:dPt>
+          <c:dPt>
+            <c:idx val="6"/>
+            <c:invertIfNegative val="0"/>
+            <c:bubble3D val="0"/>
+          </c:dPt>
+          <c:dPt>
+            <c:idx val="7"/>
+            <c:invertIfNegative val="0"/>
+            <c:bubble3D val="0"/>
+          </c:dPt>
+          <c:dPt>
+            <c:idx val="8"/>
+            <c:invertIfNegative val="0"/>
+            <c:bubble3D val="0"/>
+          </c:dPt>
+          <c:dPt>
+            <c:idx val="9"/>
+            <c:invertIfNegative val="0"/>
+            <c:bubble3D val="0"/>
+          </c:dPt>
+          <c:cat>
+            <c:strRef>
+              <c:f>'Greg''s tests'!$B$11:$K$11</c:f>
+              <c:strCache>
+                <c:ptCount val="10"/>
+                <c:pt idx="0">
+                  <c:v> 1 -&gt; 2</c:v>
+                </c:pt>
+                <c:pt idx="1">
+                  <c:v> 1 -&gt; 3</c:v>
+                </c:pt>
+                <c:pt idx="2">
+                  <c:v> 1 -&gt; 4</c:v>
+                </c:pt>
+                <c:pt idx="3">
+                  <c:v> 1 -&gt; 5</c:v>
+                </c:pt>
+                <c:pt idx="4">
+                  <c:v> 2 -&gt; 3</c:v>
+                </c:pt>
+                <c:pt idx="5">
+                  <c:v> 2 -&gt; 4</c:v>
+                </c:pt>
+                <c:pt idx="6">
+                  <c:v> 2 -&gt; 5</c:v>
+                </c:pt>
+                <c:pt idx="7">
+                  <c:v> 3 -&gt; 4</c:v>
+                </c:pt>
+                <c:pt idx="8">
+                  <c:v> 3 -&gt; 5</c:v>
+                </c:pt>
+                <c:pt idx="9">
+                  <c:v> 4 -&gt; 5</c:v>
+                </c:pt>
+              </c:strCache>
+            </c:strRef>
+          </c:cat>
+          <c:val>
+            <c:numRef>
+              <c:f>'Greg''s tests'!$B$12:$K$12</c:f>
+              <c:numCache>
+                <c:formatCode>General</c:formatCode>
+                <c:ptCount val="10"/>
+                <c:pt idx="0">
+                  <c:v>1</c:v>
+                </c:pt>
+                <c:pt idx="1">
+                  <c:v>1</c:v>
+                </c:pt>
+                <c:pt idx="2">
+                  <c:v>1</c:v>
+                </c:pt>
+                <c:pt idx="3">
+                  <c:v>0</c:v>
+                </c:pt>
+                <c:pt idx="4">
+                  <c:v>2</c:v>
+                </c:pt>
+                <c:pt idx="5">
+                  <c:v>2</c:v>
+                </c:pt>
+                <c:pt idx="6">
+                  <c:v>1</c:v>
+                </c:pt>
+                <c:pt idx="7">
+                  <c:v>1</c:v>
+                </c:pt>
+                <c:pt idx="8">
+                  <c:v>1</c:v>
+                </c:pt>
+                <c:pt idx="9">
+                  <c:v>1</c:v>
+                </c:pt>
+              </c:numCache>
+            </c:numRef>
+          </c:val>
+        </c:ser>
+        <c:dLbls>
+          <c:showLegendKey val="0"/>
+          <c:showVal val="0"/>
+          <c:showCatName val="0"/>
+          <c:showSerName val="0"/>
+          <c:showPercent val="0"/>
+          <c:showBubbleSize val="0"/>
+        </c:dLbls>
+        <c:gapWidth val="150"/>
+        <c:axId val="56582656"/>
+        <c:axId val="48845888"/>
+      </c:barChart>
+      <c:catAx>
+        <c:axId val="56582656"/>
+        <c:scaling>
+          <c:orientation val="minMax"/>
+        </c:scaling>
+        <c:delete val="0"/>
+        <c:axPos val="b"/>
+        <c:numFmt formatCode="General" sourceLinked="1"/>
+        <c:majorTickMark val="none"/>
+        <c:minorTickMark val="none"/>
+        <c:tickLblPos val="nextTo"/>
+        <c:spPr>
+          <a:noFill/>
+          <a:ln w="12700" cap="flat" cmpd="sng" algn="ctr">
+            <a:solidFill>
+              <a:schemeClr val="lt1">
+                <a:lumMod val="95000"/>
+                <a:alpha val="54000"/>
+              </a:schemeClr>
+            </a:solidFill>
+            <a:round/>
+          </a:ln>
+          <a:effectLst/>
+        </c:spPr>
+        <c:txPr>
+          <a:bodyPr rot="-60000000" spcFirstLastPara="1" vertOverflow="ellipsis" vert="horz" wrap="square" anchor="ctr" anchorCtr="1"/>
+          <a:lstStyle/>
+          <a:p>
+            <a:pPr>
+              <a:defRPr sz="900" b="0" i="0" u="none" strike="noStrike" kern="1200" baseline="0">
+                <a:solidFill>
+                  <a:schemeClr val="lt1">
+                    <a:lumMod val="85000"/>
+                  </a:schemeClr>
+                </a:solidFill>
+                <a:latin typeface="+mn-lt"/>
+                <a:ea typeface="+mn-ea"/>
+                <a:cs typeface="+mn-cs"/>
+              </a:defRPr>
+            </a:pPr>
+            <a:endParaRPr lang="en-US"/>
+          </a:p>
+        </c:txPr>
+        <c:crossAx val="48845888"/>
+        <c:crosses val="autoZero"/>
+        <c:auto val="1"/>
+        <c:lblAlgn val="ctr"/>
+        <c:lblOffset val="100"/>
+        <c:noMultiLvlLbl val="0"/>
+      </c:catAx>
+      <c:valAx>
+        <c:axId val="48845888"/>
+        <c:scaling>
+          <c:orientation val="minMax"/>
+        </c:scaling>
+        <c:delete val="0"/>
+        <c:axPos val="l"/>
+        <c:majorGridlines>
+          <c:spPr>
+            <a:ln w="9525" cap="flat" cmpd="sng" algn="ctr">
+              <a:solidFill>
+                <a:schemeClr val="lt1">
+                  <a:lumMod val="95000"/>
+                  <a:alpha val="10000"/>
+                </a:schemeClr>
+              </a:solidFill>
+              <a:round/>
+            </a:ln>
+            <a:effectLst/>
+          </c:spPr>
+        </c:majorGridlines>
+        <c:numFmt formatCode="General" sourceLinked="1"/>
+        <c:majorTickMark val="none"/>
+        <c:minorTickMark val="none"/>
+        <c:tickLblPos val="nextTo"/>
+        <c:spPr>
+          <a:noFill/>
+          <a:ln>
+            <a:noFill/>
+          </a:ln>
+          <a:effectLst/>
+        </c:spPr>
+        <c:txPr>
+          <a:bodyPr rot="-60000000" spcFirstLastPara="1" vertOverflow="ellipsis" vert="horz" wrap="square" anchor="ctr" anchorCtr="1"/>
+          <a:lstStyle/>
+          <a:p>
+            <a:pPr>
+              <a:defRPr sz="900" b="0" i="0" u="none" strike="noStrike" kern="1200" baseline="0">
+                <a:solidFill>
+                  <a:schemeClr val="lt1">
+                    <a:lumMod val="85000"/>
+                  </a:schemeClr>
+                </a:solidFill>
+                <a:latin typeface="+mn-lt"/>
+                <a:ea typeface="+mn-ea"/>
+                <a:cs typeface="+mn-cs"/>
+              </a:defRPr>
+            </a:pPr>
+            <a:endParaRPr lang="en-US"/>
+          </a:p>
+        </c:txPr>
+        <c:crossAx val="56582656"/>
+        <c:crosses val="autoZero"/>
+        <c:crossBetween val="between"/>
+      </c:valAx>
+      <c:spPr>
+        <a:noFill/>
+        <a:ln>
+          <a:noFill/>
+        </a:ln>
+        <a:effectLst/>
+      </c:spPr>
+    </c:plotArea>
+    <c:legend>
+      <c:legendPos val="r"/>
+      <c:layout/>
+      <c:overlay val="0"/>
+      <c:spPr>
+        <a:noFill/>
+        <a:ln>
+          <a:noFill/>
+        </a:ln>
+        <a:effectLst/>
+      </c:spPr>
+      <c:txPr>
+        <a:bodyPr rot="0" spcFirstLastPara="1" vertOverflow="ellipsis" vert="horz" wrap="square" anchor="ctr" anchorCtr="1"/>
+        <a:lstStyle/>
+        <a:p>
+          <a:pPr>
+            <a:defRPr sz="900" b="0" i="0" u="none" strike="noStrike" kern="1200" baseline="0">
+              <a:solidFill>
+                <a:schemeClr val="lt1">
+                  <a:lumMod val="85000"/>
+                </a:schemeClr>
+              </a:solidFill>
+              <a:latin typeface="+mn-lt"/>
+              <a:ea typeface="+mn-ea"/>
+              <a:cs typeface="+mn-cs"/>
+            </a:defRPr>
+          </a:pPr>
+          <a:endParaRPr lang="en-US"/>
+        </a:p>
+      </c:txPr>
+    </c:legend>
+    <c:plotVisOnly val="1"/>
+    <c:dispBlanksAs val="gap"/>
+    <c:showDLblsOverMax val="0"/>
+  </c:chart>
+  <c:spPr>
+    <a:gradFill flip="none" rotWithShape="1">
+      <a:gsLst>
+        <a:gs pos="0">
+          <a:schemeClr val="dk1">
+            <a:lumMod val="65000"/>
+            <a:lumOff val="35000"/>
+          </a:schemeClr>
+        </a:gs>
+        <a:gs pos="100000">
+          <a:schemeClr val="dk1">
+            <a:lumMod val="85000"/>
+            <a:lumOff val="15000"/>
+          </a:schemeClr>
+        </a:gs>
+      </a:gsLst>
+      <a:path path="circle">
+        <a:fillToRect l="50000" t="50000" r="50000" b="50000"/>
+      </a:path>
+      <a:tileRect/>
+    </a:gradFill>
+    <a:ln>
+      <a:noFill/>
+    </a:ln>
+    <a:effectLst/>
+  </c:spPr>
+  <c:txPr>
+    <a:bodyPr/>
+    <a:lstStyle/>
+    <a:p>
+      <a:pPr>
+        <a:defRPr/>
+      </a:pPr>
+      <a:endParaRPr lang="en-US"/>
+    </a:p>
+  </c:txPr>
+  <c:externalData r:id="rId1">
+    <c:autoUpdate val="0"/>
+  </c:externalData>
+</c:chartSpace>
+</file>
+
+<file path=ppt/charts/chart11.xml><?xml version="1.0" encoding="utf-8"?>
+<c:chartSpace xmlns:c="http://schemas.openxmlformats.org/drawingml/2006/chart" xmlns:a="http://schemas.openxmlformats.org/drawingml/2006/main" xmlns:r="http://schemas.openxmlformats.org/officeDocument/2006/relationships">
+  <c:date1904 val="0"/>
+  <c:lang val="en-US"/>
+  <c:roundedCorners val="0"/>
+  <mc:AlternateContent xmlns:mc="http://schemas.openxmlformats.org/markup-compatibility/2006">
+    <mc:Choice xmlns:c14="http://schemas.microsoft.com/office/drawing/2007/8/2/chart" Requires="c14">
+      <c14:style val="106"/>
+    </mc:Choice>
+    <mc:Fallback>
+      <c:style val="6"/>
+    </mc:Fallback>
+  </mc:AlternateContent>
+  <c:chart>
+    <c:title>
+      <c:layout/>
+      <c:overlay val="0"/>
+      <c:spPr>
+        <a:noFill/>
+        <a:ln>
+          <a:noFill/>
+        </a:ln>
+        <a:effectLst/>
+      </c:spPr>
+      <c:txPr>
+        <a:bodyPr rot="0" spcFirstLastPara="1" vertOverflow="ellipsis" vert="horz" wrap="square" anchor="ctr" anchorCtr="1"/>
+        <a:lstStyle/>
+        <a:p>
+          <a:pPr>
+            <a:defRPr sz="1600" b="1" i="0" u="none" strike="noStrike" kern="1200" spc="100" baseline="0">
+              <a:solidFill>
+                <a:schemeClr val="lt1">
+                  <a:lumMod val="95000"/>
+                </a:schemeClr>
+              </a:solidFill>
+              <a:effectLst>
+                <a:outerShdw blurRad="50800" dist="38100" dir="5400000" algn="t" rotWithShape="0">
+                  <a:prstClr val="black">
+                    <a:alpha val="40000"/>
+                  </a:prstClr>
+                </a:outerShdw>
+              </a:effectLst>
+              <a:latin typeface="+mn-lt"/>
+              <a:ea typeface="+mn-ea"/>
+              <a:cs typeface="+mn-cs"/>
+            </a:defRPr>
+          </a:pPr>
+          <a:endParaRPr lang="en-US"/>
+        </a:p>
+      </c:txPr>
+    </c:title>
+    <c:autoTitleDeleted val="0"/>
+    <c:plotArea>
+      <c:layout/>
+      <c:barChart>
+        <c:barDir val="col"/>
+        <c:grouping val="clustered"/>
+        <c:varyColors val="0"/>
+        <c:ser>
+          <c:idx val="0"/>
+          <c:order val="0"/>
+          <c:tx>
+            <c:strRef>
+              <c:f>'Greg''s tests'!$A$15</c:f>
+              <c:strCache>
+                <c:ptCount val="1"/>
+                <c:pt idx="0">
+                  <c:v>Needleman-Wunsch Distance</c:v>
+                </c:pt>
+              </c:strCache>
+            </c:strRef>
+          </c:tx>
+          <c:spPr>
+            <a:gradFill rotWithShape="1">
+              <a:gsLst>
+                <a:gs pos="0">
+                  <a:schemeClr val="accent4">
+                    <a:shade val="51000"/>
+                    <a:satMod val="130000"/>
+                  </a:schemeClr>
+                </a:gs>
+                <a:gs pos="80000">
+                  <a:schemeClr val="accent4">
+                    <a:shade val="93000"/>
+                    <a:satMod val="130000"/>
+                  </a:schemeClr>
+                </a:gs>
+                <a:gs pos="100000">
+                  <a:schemeClr val="accent4">
+                    <a:shade val="94000"/>
+                    <a:satMod val="135000"/>
+                  </a:schemeClr>
+                </a:gs>
+              </a:gsLst>
+              <a:lin ang="16200000" scaled="0"/>
+            </a:gradFill>
+            <a:ln>
+              <a:noFill/>
+            </a:ln>
+            <a:effectLst>
+              <a:outerShdw blurRad="40000" dist="23000" dir="5400000" rotWithShape="0">
+                <a:srgbClr val="000000">
+                  <a:alpha val="35000"/>
+                </a:srgbClr>
+              </a:outerShdw>
+            </a:effectLst>
+            <a:scene3d>
+              <a:camera prst="orthographicFront">
+                <a:rot lat="0" lon="0" rev="0"/>
+              </a:camera>
+              <a:lightRig rig="threePt" dir="t">
+                <a:rot lat="0" lon="0" rev="1200000"/>
+              </a:lightRig>
+            </a:scene3d>
+            <a:sp3d>
+              <a:bevelT w="63500" h="25400"/>
+            </a:sp3d>
+          </c:spPr>
+          <c:invertIfNegative val="0"/>
+          <c:dPt>
+            <c:idx val="0"/>
+            <c:invertIfNegative val="0"/>
+            <c:bubble3D val="0"/>
+          </c:dPt>
+          <c:dPt>
+            <c:idx val="1"/>
+            <c:invertIfNegative val="0"/>
+            <c:bubble3D val="0"/>
+          </c:dPt>
+          <c:dPt>
+            <c:idx val="2"/>
+            <c:invertIfNegative val="0"/>
+            <c:bubble3D val="0"/>
+          </c:dPt>
+          <c:dPt>
+            <c:idx val="3"/>
+            <c:invertIfNegative val="0"/>
+            <c:bubble3D val="0"/>
+            <c:explosion val="27"/>
+          </c:dPt>
+          <c:dPt>
+            <c:idx val="4"/>
+            <c:invertIfNegative val="0"/>
+            <c:bubble3D val="0"/>
+          </c:dPt>
+          <c:dPt>
+            <c:idx val="5"/>
+            <c:invertIfNegative val="0"/>
+            <c:bubble3D val="0"/>
+          </c:dPt>
+          <c:dPt>
+            <c:idx val="6"/>
+            <c:invertIfNegative val="0"/>
+            <c:bubble3D val="0"/>
+          </c:dPt>
+          <c:dPt>
+            <c:idx val="7"/>
+            <c:invertIfNegative val="0"/>
+            <c:bubble3D val="0"/>
+          </c:dPt>
+          <c:dPt>
+            <c:idx val="8"/>
+            <c:invertIfNegative val="0"/>
+            <c:bubble3D val="0"/>
+          </c:dPt>
+          <c:dPt>
+            <c:idx val="9"/>
+            <c:invertIfNegative val="0"/>
+            <c:bubble3D val="0"/>
+          </c:dPt>
+          <c:cat>
+            <c:strRef>
+              <c:f>'Greg''s tests'!$B$11:$K$11</c:f>
+              <c:strCache>
+                <c:ptCount val="10"/>
+                <c:pt idx="0">
+                  <c:v> 1 -&gt; 2</c:v>
+                </c:pt>
+                <c:pt idx="1">
+                  <c:v> 1 -&gt; 3</c:v>
+                </c:pt>
+                <c:pt idx="2">
+                  <c:v> 1 -&gt; 4</c:v>
+                </c:pt>
+                <c:pt idx="3">
+                  <c:v> 1 -&gt; 5</c:v>
+                </c:pt>
+                <c:pt idx="4">
+                  <c:v> 2 -&gt; 3</c:v>
+                </c:pt>
+                <c:pt idx="5">
+                  <c:v> 2 -&gt; 4</c:v>
+                </c:pt>
+                <c:pt idx="6">
+                  <c:v> 2 -&gt; 5</c:v>
+                </c:pt>
+                <c:pt idx="7">
+                  <c:v> 3 -&gt; 4</c:v>
+                </c:pt>
+                <c:pt idx="8">
+                  <c:v> 3 -&gt; 5</c:v>
+                </c:pt>
+                <c:pt idx="9">
+                  <c:v> 4 -&gt; 5</c:v>
+                </c:pt>
+              </c:strCache>
+            </c:strRef>
+          </c:cat>
+          <c:val>
+            <c:numRef>
+              <c:f>'Greg''s tests'!$B$15:$K$15</c:f>
+              <c:numCache>
+                <c:formatCode>General</c:formatCode>
+                <c:ptCount val="10"/>
+                <c:pt idx="0">
+                  <c:v>59</c:v>
+                </c:pt>
+                <c:pt idx="1">
+                  <c:v>85</c:v>
+                </c:pt>
+                <c:pt idx="2">
+                  <c:v>84</c:v>
+                </c:pt>
+                <c:pt idx="3">
+                  <c:v>109</c:v>
+                </c:pt>
+                <c:pt idx="4">
+                  <c:v>69</c:v>
+                </c:pt>
+                <c:pt idx="5">
+                  <c:v>66</c:v>
+                </c:pt>
+                <c:pt idx="6">
+                  <c:v>59</c:v>
+                </c:pt>
+                <c:pt idx="7">
+                  <c:v>98</c:v>
+                </c:pt>
+                <c:pt idx="8">
+                  <c:v>85</c:v>
+                </c:pt>
+                <c:pt idx="9">
+                  <c:v>84</c:v>
+                </c:pt>
+              </c:numCache>
+            </c:numRef>
+          </c:val>
+        </c:ser>
+        <c:dLbls>
+          <c:showLegendKey val="0"/>
+          <c:showVal val="0"/>
+          <c:showCatName val="0"/>
+          <c:showSerName val="0"/>
+          <c:showPercent val="0"/>
+          <c:showBubbleSize val="0"/>
+        </c:dLbls>
+        <c:gapWidth val="150"/>
+        <c:axId val="52346880"/>
+        <c:axId val="56473216"/>
+      </c:barChart>
+      <c:catAx>
+        <c:axId val="52346880"/>
+        <c:scaling>
+          <c:orientation val="minMax"/>
+        </c:scaling>
+        <c:delete val="0"/>
+        <c:axPos val="b"/>
+        <c:numFmt formatCode="General" sourceLinked="1"/>
+        <c:majorTickMark val="none"/>
+        <c:minorTickMark val="none"/>
+        <c:tickLblPos val="nextTo"/>
+        <c:spPr>
+          <a:noFill/>
+          <a:ln w="12700" cap="flat" cmpd="sng" algn="ctr">
+            <a:solidFill>
+              <a:schemeClr val="lt1">
+                <a:lumMod val="95000"/>
+                <a:alpha val="54000"/>
+              </a:schemeClr>
+            </a:solidFill>
+            <a:round/>
+          </a:ln>
+          <a:effectLst/>
+        </c:spPr>
+        <c:txPr>
+          <a:bodyPr rot="-60000000" spcFirstLastPara="1" vertOverflow="ellipsis" vert="horz" wrap="square" anchor="ctr" anchorCtr="1"/>
+          <a:lstStyle/>
+          <a:p>
+            <a:pPr>
+              <a:defRPr sz="900" b="0" i="0" u="none" strike="noStrike" kern="1200" baseline="0">
+                <a:solidFill>
+                  <a:schemeClr val="lt1">
+                    <a:lumMod val="85000"/>
+                  </a:schemeClr>
+                </a:solidFill>
+                <a:latin typeface="+mn-lt"/>
+                <a:ea typeface="+mn-ea"/>
+                <a:cs typeface="+mn-cs"/>
+              </a:defRPr>
+            </a:pPr>
+            <a:endParaRPr lang="en-US"/>
+          </a:p>
+        </c:txPr>
+        <c:crossAx val="56473216"/>
+        <c:crosses val="autoZero"/>
+        <c:auto val="1"/>
+        <c:lblAlgn val="ctr"/>
+        <c:lblOffset val="100"/>
+        <c:noMultiLvlLbl val="0"/>
+      </c:catAx>
+      <c:valAx>
+        <c:axId val="56473216"/>
+        <c:scaling>
+          <c:orientation val="minMax"/>
+        </c:scaling>
+        <c:delete val="0"/>
+        <c:axPos val="l"/>
+        <c:majorGridlines>
+          <c:spPr>
+            <a:ln w="9525" cap="flat" cmpd="sng" algn="ctr">
+              <a:solidFill>
+                <a:schemeClr val="lt1">
+                  <a:lumMod val="95000"/>
+                  <a:alpha val="10000"/>
+                </a:schemeClr>
+              </a:solidFill>
+              <a:round/>
+            </a:ln>
+            <a:effectLst/>
+          </c:spPr>
+        </c:majorGridlines>
+        <c:numFmt formatCode="General" sourceLinked="1"/>
+        <c:majorTickMark val="none"/>
+        <c:minorTickMark val="none"/>
+        <c:tickLblPos val="nextTo"/>
+        <c:spPr>
+          <a:noFill/>
+          <a:ln>
+            <a:noFill/>
+          </a:ln>
+          <a:effectLst/>
+        </c:spPr>
+        <c:txPr>
+          <a:bodyPr rot="-60000000" spcFirstLastPara="1" vertOverflow="ellipsis" vert="horz" wrap="square" anchor="ctr" anchorCtr="1"/>
+          <a:lstStyle/>
+          <a:p>
+            <a:pPr>
+              <a:defRPr sz="900" b="0" i="0" u="none" strike="noStrike" kern="1200" baseline="0">
+                <a:solidFill>
+                  <a:schemeClr val="lt1">
+                    <a:lumMod val="85000"/>
+                  </a:schemeClr>
+                </a:solidFill>
+                <a:latin typeface="+mn-lt"/>
+                <a:ea typeface="+mn-ea"/>
+                <a:cs typeface="+mn-cs"/>
+              </a:defRPr>
+            </a:pPr>
+            <a:endParaRPr lang="en-US"/>
+          </a:p>
+        </c:txPr>
+        <c:crossAx val="52346880"/>
+        <c:crosses val="autoZero"/>
+        <c:crossBetween val="between"/>
+      </c:valAx>
+      <c:spPr>
+        <a:noFill/>
+        <a:ln>
+          <a:noFill/>
+        </a:ln>
+        <a:effectLst/>
+      </c:spPr>
+    </c:plotArea>
+    <c:legend>
+      <c:legendPos val="r"/>
+      <c:layout/>
+      <c:overlay val="0"/>
+      <c:spPr>
+        <a:noFill/>
+        <a:ln>
+          <a:noFill/>
+        </a:ln>
+        <a:effectLst/>
+      </c:spPr>
+      <c:txPr>
+        <a:bodyPr rot="0" spcFirstLastPara="1" vertOverflow="ellipsis" vert="horz" wrap="square" anchor="ctr" anchorCtr="1"/>
+        <a:lstStyle/>
+        <a:p>
+          <a:pPr>
+            <a:defRPr sz="900" b="0" i="0" u="none" strike="noStrike" kern="1200" baseline="0">
+              <a:solidFill>
+                <a:schemeClr val="lt1">
+                  <a:lumMod val="85000"/>
+                </a:schemeClr>
+              </a:solidFill>
+              <a:latin typeface="+mn-lt"/>
+              <a:ea typeface="+mn-ea"/>
+              <a:cs typeface="+mn-cs"/>
+            </a:defRPr>
+          </a:pPr>
+          <a:endParaRPr lang="en-US"/>
+        </a:p>
+      </c:txPr>
+    </c:legend>
+    <c:plotVisOnly val="1"/>
+    <c:dispBlanksAs val="gap"/>
+    <c:showDLblsOverMax val="0"/>
+  </c:chart>
+  <c:spPr>
+    <a:gradFill flip="none" rotWithShape="1">
+      <a:gsLst>
+        <a:gs pos="0">
+          <a:schemeClr val="dk1">
+            <a:lumMod val="65000"/>
+            <a:lumOff val="35000"/>
+          </a:schemeClr>
+        </a:gs>
+        <a:gs pos="100000">
+          <a:schemeClr val="dk1">
+            <a:lumMod val="85000"/>
+            <a:lumOff val="15000"/>
+          </a:schemeClr>
+        </a:gs>
+      </a:gsLst>
+      <a:path path="circle">
+        <a:fillToRect l="50000" t="50000" r="50000" b="50000"/>
+      </a:path>
+      <a:tileRect/>
+    </a:gradFill>
+    <a:ln>
+      <a:noFill/>
+    </a:ln>
+    <a:effectLst/>
+  </c:spPr>
+  <c:txPr>
+    <a:bodyPr/>
+    <a:lstStyle/>
+    <a:p>
+      <a:pPr>
+        <a:defRPr/>
+      </a:pPr>
+      <a:endParaRPr lang="en-US"/>
+    </a:p>
+  </c:txPr>
+  <c:externalData r:id="rId1">
+    <c:autoUpdate val="0"/>
+  </c:externalData>
+</c:chartSpace>
+</file>
+
+<file path=ppt/charts/chart12.xml><?xml version="1.0" encoding="utf-8"?>
+<c:chartSpace xmlns:c="http://schemas.openxmlformats.org/drawingml/2006/chart" xmlns:a="http://schemas.openxmlformats.org/drawingml/2006/main" xmlns:r="http://schemas.openxmlformats.org/officeDocument/2006/relationships">
+  <c:date1904 val="0"/>
+  <c:lang val="en-US"/>
+  <c:roundedCorners val="0"/>
+  <mc:AlternateContent xmlns:mc="http://schemas.openxmlformats.org/markup-compatibility/2006">
+    <mc:Choice xmlns:c14="http://schemas.microsoft.com/office/drawing/2007/8/2/chart" Requires="c14">
+      <c14:style val="102"/>
+    </mc:Choice>
+    <mc:Fallback>
+      <c:style val="2"/>
+    </mc:Fallback>
+  </mc:AlternateContent>
+  <c:chart>
+    <c:title>
+      <c:tx>
+        <c:rich>
+          <a:bodyPr rot="0" spcFirstLastPara="1" vertOverflow="ellipsis" vert="horz" wrap="square" anchor="ctr" anchorCtr="1"/>
+          <a:lstStyle/>
+          <a:p>
+            <a:pPr>
+              <a:defRPr sz="1600" b="1" i="0" u="none" strike="noStrike" kern="1200" spc="100" baseline="0">
+                <a:solidFill>
+                  <a:schemeClr val="lt1">
+                    <a:lumMod val="95000"/>
+                  </a:schemeClr>
+                </a:solidFill>
+                <a:effectLst>
+                  <a:outerShdw blurRad="50800" dist="38100" dir="5400000" algn="t" rotWithShape="0">
+                    <a:prstClr val="black">
+                      <a:alpha val="40000"/>
+                    </a:prstClr>
+                  </a:outerShdw>
+                </a:effectLst>
+                <a:latin typeface="+mn-lt"/>
+                <a:ea typeface="+mn-ea"/>
+                <a:cs typeface="+mn-cs"/>
+              </a:defRPr>
+            </a:pPr>
+            <a:r>
+              <a:rPr lang="en-US"/>
+              <a:t>Levenshtein's vs Needleman-Wunsch</a:t>
+            </a:r>
+          </a:p>
+        </c:rich>
+      </c:tx>
+      <c:layout/>
+      <c:overlay val="0"/>
+      <c:spPr>
+        <a:noFill/>
+        <a:ln>
+          <a:noFill/>
+        </a:ln>
+        <a:effectLst/>
+      </c:spPr>
+    </c:title>
+    <c:autoTitleDeleted val="0"/>
+    <c:plotArea>
+      <c:layout/>
+      <c:barChart>
+        <c:barDir val="col"/>
+        <c:grouping val="clustered"/>
+        <c:varyColors val="0"/>
+        <c:ser>
+          <c:idx val="0"/>
+          <c:order val="0"/>
+          <c:tx>
+            <c:strRef>
+              <c:f>'Greg''s tests'!$A$3</c:f>
+              <c:strCache>
+                <c:ptCount val="1"/>
+                <c:pt idx="0">
+                  <c:v>Levenshtein's Distance</c:v>
+                </c:pt>
+              </c:strCache>
+            </c:strRef>
+          </c:tx>
+          <c:spPr>
+            <a:gradFill rotWithShape="1">
+              <a:gsLst>
+                <a:gs pos="0">
+                  <a:schemeClr val="accent2">
+                    <a:shade val="51000"/>
+                    <a:satMod val="130000"/>
+                  </a:schemeClr>
+                </a:gs>
+                <a:gs pos="80000">
+                  <a:schemeClr val="accent2">
+                    <a:shade val="93000"/>
+                    <a:satMod val="130000"/>
+                  </a:schemeClr>
+                </a:gs>
+                <a:gs pos="100000">
+                  <a:schemeClr val="accent2">
+                    <a:shade val="94000"/>
+                    <a:satMod val="135000"/>
+                  </a:schemeClr>
+                </a:gs>
+              </a:gsLst>
+              <a:lin ang="16200000" scaled="0"/>
+            </a:gradFill>
+            <a:ln>
+              <a:noFill/>
+            </a:ln>
+            <a:effectLst>
+              <a:outerShdw blurRad="40000" dist="23000" dir="5400000" rotWithShape="0">
+                <a:srgbClr val="000000">
+                  <a:alpha val="35000"/>
+                </a:srgbClr>
+              </a:outerShdw>
+            </a:effectLst>
+            <a:scene3d>
+              <a:camera prst="orthographicFront">
+                <a:rot lat="0" lon="0" rev="0"/>
+              </a:camera>
+              <a:lightRig rig="threePt" dir="t">
+                <a:rot lat="0" lon="0" rev="1200000"/>
+              </a:lightRig>
+            </a:scene3d>
+            <a:sp3d>
+              <a:bevelT w="63500" h="25400"/>
+            </a:sp3d>
+          </c:spPr>
+          <c:invertIfNegative val="0"/>
+          <c:cat>
+            <c:strRef>
+              <c:f>'Greg''s tests'!$B$2:$D$2</c:f>
+              <c:strCache>
+                <c:ptCount val="3"/>
+                <c:pt idx="0">
+                  <c:v> 1 -&gt; 2</c:v>
+                </c:pt>
+                <c:pt idx="1">
+                  <c:v> 1 -&gt; 3</c:v>
+                </c:pt>
+                <c:pt idx="2">
+                  <c:v> 2 -&gt; 3</c:v>
+                </c:pt>
+              </c:strCache>
+            </c:strRef>
+          </c:cat>
+          <c:val>
+            <c:numRef>
+              <c:f>'Greg''s tests'!$B$3:$D$3</c:f>
+              <c:numCache>
+                <c:formatCode>General</c:formatCode>
+                <c:ptCount val="3"/>
+                <c:pt idx="0">
+                  <c:v>11</c:v>
+                </c:pt>
+                <c:pt idx="1">
+                  <c:v>14</c:v>
+                </c:pt>
+                <c:pt idx="2">
+                  <c:v>6</c:v>
+                </c:pt>
+              </c:numCache>
+            </c:numRef>
+          </c:val>
+        </c:ser>
+        <c:ser>
+          <c:idx val="1"/>
+          <c:order val="1"/>
+          <c:tx>
+            <c:strRef>
+              <c:f>'Greg''s tests'!$A$6</c:f>
+              <c:strCache>
+                <c:ptCount val="1"/>
+                <c:pt idx="0">
+                  <c:v>Needleman-Wunsch Distance</c:v>
+                </c:pt>
+              </c:strCache>
+            </c:strRef>
+          </c:tx>
+          <c:spPr>
+            <a:gradFill rotWithShape="1">
+              <a:gsLst>
+                <a:gs pos="0">
+                  <a:schemeClr val="accent4">
+                    <a:shade val="51000"/>
+                    <a:satMod val="130000"/>
+                  </a:schemeClr>
+                </a:gs>
+                <a:gs pos="80000">
+                  <a:schemeClr val="accent4">
+                    <a:shade val="93000"/>
+                    <a:satMod val="130000"/>
+                  </a:schemeClr>
+                </a:gs>
+                <a:gs pos="100000">
+                  <a:schemeClr val="accent4">
+                    <a:shade val="94000"/>
+                    <a:satMod val="135000"/>
+                  </a:schemeClr>
+                </a:gs>
+              </a:gsLst>
+              <a:lin ang="16200000" scaled="0"/>
+            </a:gradFill>
+            <a:ln>
+              <a:noFill/>
+            </a:ln>
+            <a:effectLst>
+              <a:outerShdw blurRad="40000" dist="23000" dir="5400000" rotWithShape="0">
+                <a:srgbClr val="000000">
+                  <a:alpha val="35000"/>
+                </a:srgbClr>
+              </a:outerShdw>
+            </a:effectLst>
+            <a:scene3d>
+              <a:camera prst="orthographicFront">
+                <a:rot lat="0" lon="0" rev="0"/>
+              </a:camera>
+              <a:lightRig rig="threePt" dir="t">
+                <a:rot lat="0" lon="0" rev="1200000"/>
+              </a:lightRig>
+            </a:scene3d>
+            <a:sp3d>
+              <a:bevelT w="63500" h="25400"/>
+            </a:sp3d>
+          </c:spPr>
+          <c:invertIfNegative val="0"/>
+          <c:cat>
+            <c:strRef>
+              <c:f>'Greg''s tests'!$B$2:$D$2</c:f>
+              <c:strCache>
+                <c:ptCount val="3"/>
+                <c:pt idx="0">
+                  <c:v> 1 -&gt; 2</c:v>
+                </c:pt>
+                <c:pt idx="1">
+                  <c:v> 1 -&gt; 3</c:v>
+                </c:pt>
+                <c:pt idx="2">
+                  <c:v> 2 -&gt; 3</c:v>
+                </c:pt>
+              </c:strCache>
+            </c:strRef>
+          </c:cat>
+          <c:val>
+            <c:numRef>
+              <c:f>'Greg''s tests'!$B$6:$D$6</c:f>
+              <c:numCache>
+                <c:formatCode>General</c:formatCode>
+                <c:ptCount val="3"/>
+                <c:pt idx="0">
+                  <c:v>50</c:v>
+                </c:pt>
+                <c:pt idx="1">
+                  <c:v>40</c:v>
+                </c:pt>
+                <c:pt idx="2">
+                  <c:v>64</c:v>
+                </c:pt>
+              </c:numCache>
+            </c:numRef>
+          </c:val>
+        </c:ser>
+        <c:dLbls>
+          <c:showLegendKey val="0"/>
+          <c:showVal val="0"/>
+          <c:showCatName val="0"/>
+          <c:showSerName val="0"/>
+          <c:showPercent val="0"/>
+          <c:showBubbleSize val="0"/>
+        </c:dLbls>
+        <c:gapWidth val="150"/>
+        <c:axId val="52350464"/>
+        <c:axId val="56468032"/>
+      </c:barChart>
+      <c:catAx>
+        <c:axId val="52350464"/>
+        <c:scaling>
+          <c:orientation val="minMax"/>
+        </c:scaling>
+        <c:delete val="0"/>
+        <c:axPos val="b"/>
+        <c:numFmt formatCode="General" sourceLinked="1"/>
+        <c:majorTickMark val="none"/>
+        <c:minorTickMark val="none"/>
+        <c:tickLblPos val="nextTo"/>
+        <c:spPr>
+          <a:noFill/>
+          <a:ln w="12700" cap="flat" cmpd="sng" algn="ctr">
+            <a:solidFill>
+              <a:schemeClr val="lt1">
+                <a:lumMod val="95000"/>
+                <a:alpha val="54000"/>
+              </a:schemeClr>
+            </a:solidFill>
+            <a:round/>
+          </a:ln>
+          <a:effectLst/>
+        </c:spPr>
+        <c:txPr>
+          <a:bodyPr rot="-60000000" spcFirstLastPara="1" vertOverflow="ellipsis" vert="horz" wrap="square" anchor="ctr" anchorCtr="1"/>
+          <a:lstStyle/>
+          <a:p>
+            <a:pPr>
+              <a:defRPr sz="900" b="0" i="0" u="none" strike="noStrike" kern="1200" baseline="0">
+                <a:solidFill>
+                  <a:schemeClr val="lt1">
+                    <a:lumMod val="85000"/>
+                  </a:schemeClr>
+                </a:solidFill>
+                <a:latin typeface="+mn-lt"/>
+                <a:ea typeface="+mn-ea"/>
+                <a:cs typeface="+mn-cs"/>
+              </a:defRPr>
+            </a:pPr>
+            <a:endParaRPr lang="en-US"/>
+          </a:p>
+        </c:txPr>
+        <c:crossAx val="56468032"/>
+        <c:crosses val="autoZero"/>
+        <c:auto val="1"/>
+        <c:lblAlgn val="ctr"/>
+        <c:lblOffset val="100"/>
+        <c:noMultiLvlLbl val="0"/>
+      </c:catAx>
+      <c:valAx>
+        <c:axId val="56468032"/>
+        <c:scaling>
+          <c:orientation val="minMax"/>
+        </c:scaling>
+        <c:delete val="0"/>
+        <c:axPos val="l"/>
+        <c:majorGridlines>
+          <c:spPr>
+            <a:ln w="9525" cap="flat" cmpd="sng" algn="ctr">
+              <a:solidFill>
+                <a:schemeClr val="lt1">
+                  <a:lumMod val="95000"/>
+                  <a:alpha val="10000"/>
+                </a:schemeClr>
+              </a:solidFill>
+              <a:round/>
+            </a:ln>
+            <a:effectLst/>
+          </c:spPr>
+        </c:majorGridlines>
+        <c:numFmt formatCode="General" sourceLinked="1"/>
+        <c:majorTickMark val="none"/>
+        <c:minorTickMark val="none"/>
+        <c:tickLblPos val="nextTo"/>
+        <c:spPr>
+          <a:noFill/>
+          <a:ln>
+            <a:noFill/>
+          </a:ln>
+          <a:effectLst/>
+        </c:spPr>
+        <c:txPr>
+          <a:bodyPr rot="-60000000" spcFirstLastPara="1" vertOverflow="ellipsis" vert="horz" wrap="square" anchor="ctr" anchorCtr="1"/>
+          <a:lstStyle/>
+          <a:p>
+            <a:pPr>
+              <a:defRPr sz="900" b="0" i="0" u="none" strike="noStrike" kern="1200" baseline="0">
+                <a:solidFill>
+                  <a:schemeClr val="lt1">
+                    <a:lumMod val="85000"/>
+                  </a:schemeClr>
+                </a:solidFill>
+                <a:latin typeface="+mn-lt"/>
+                <a:ea typeface="+mn-ea"/>
+                <a:cs typeface="+mn-cs"/>
+              </a:defRPr>
+            </a:pPr>
+            <a:endParaRPr lang="en-US"/>
+          </a:p>
+        </c:txPr>
+        <c:crossAx val="52350464"/>
+        <c:crosses val="autoZero"/>
+        <c:crossBetween val="between"/>
+      </c:valAx>
+      <c:spPr>
+        <a:noFill/>
+        <a:ln>
+          <a:noFill/>
+        </a:ln>
+        <a:effectLst/>
+      </c:spPr>
+    </c:plotArea>
+    <c:plotVisOnly val="1"/>
+    <c:dispBlanksAs val="gap"/>
+    <c:showDLblsOverMax val="0"/>
+  </c:chart>
+  <c:spPr>
+    <a:gradFill flip="none" rotWithShape="1">
+      <a:gsLst>
+        <a:gs pos="0">
+          <a:schemeClr val="dk1">
+            <a:lumMod val="65000"/>
+            <a:lumOff val="35000"/>
+          </a:schemeClr>
+        </a:gs>
+        <a:gs pos="100000">
+          <a:schemeClr val="dk1">
+            <a:lumMod val="85000"/>
+            <a:lumOff val="15000"/>
+          </a:schemeClr>
+        </a:gs>
+      </a:gsLst>
+      <a:path path="circle">
+        <a:fillToRect l="50000" t="50000" r="50000" b="50000"/>
+      </a:path>
+      <a:tileRect/>
+    </a:gradFill>
+    <a:ln>
+      <a:noFill/>
+    </a:ln>
+    <a:effectLst/>
+  </c:spPr>
+  <c:txPr>
+    <a:bodyPr/>
+    <a:lstStyle/>
+    <a:p>
+      <a:pPr>
+        <a:defRPr/>
+      </a:pPr>
+      <a:endParaRPr lang="en-US"/>
+    </a:p>
+  </c:txPr>
+  <c:externalData r:id="rId1">
+    <c:autoUpdate val="0"/>
+  </c:externalData>
+</c:chartSpace>
+</file>
+
+<file path=ppt/charts/chart13.xml><?xml version="1.0" encoding="utf-8"?>
+<c:chartSpace xmlns:c="http://schemas.openxmlformats.org/drawingml/2006/chart" xmlns:a="http://schemas.openxmlformats.org/drawingml/2006/main" xmlns:r="http://schemas.openxmlformats.org/officeDocument/2006/relationships">
+  <c:date1904 val="0"/>
+  <c:lang val="en-US"/>
+  <c:roundedCorners val="0"/>
+  <mc:AlternateContent xmlns:mc="http://schemas.openxmlformats.org/markup-compatibility/2006">
+    <mc:Choice xmlns:c14="http://schemas.microsoft.com/office/drawing/2007/8/2/chart" Requires="c14">
+      <c14:style val="102"/>
+    </mc:Choice>
+    <mc:Fallback>
+      <c:style val="2"/>
+    </mc:Fallback>
+  </mc:AlternateContent>
+  <c:chart>
+    <c:title>
+      <c:tx>
+        <c:rich>
+          <a:bodyPr rot="0" spcFirstLastPara="1" vertOverflow="ellipsis" vert="horz" wrap="square" anchor="ctr" anchorCtr="1"/>
+          <a:lstStyle/>
+          <a:p>
+            <a:pPr>
+              <a:defRPr sz="1400" b="0" i="0" u="none" strike="noStrike" kern="1200" spc="0" baseline="0">
+                <a:solidFill>
+                  <a:schemeClr val="tx1">
+                    <a:lumMod val="65000"/>
+                    <a:lumOff val="35000"/>
+                  </a:schemeClr>
+                </a:solidFill>
+                <a:latin typeface="+mn-lt"/>
+                <a:ea typeface="+mn-ea"/>
+                <a:cs typeface="+mn-cs"/>
+              </a:defRPr>
+            </a:pPr>
+            <a:r>
+              <a:rPr lang="en-US"/>
+              <a:t>Levenshtein vs. Needleman-Wunsch</a:t>
+            </a:r>
+          </a:p>
+        </c:rich>
+      </c:tx>
+      <c:layout/>
+      <c:overlay val="0"/>
+      <c:spPr>
+        <a:noFill/>
+        <a:ln>
+          <a:noFill/>
+        </a:ln>
+        <a:effectLst/>
+      </c:spPr>
+    </c:title>
+    <c:autoTitleDeleted val="0"/>
+    <c:plotArea>
+      <c:layout/>
+      <c:barChart>
+        <c:barDir val="col"/>
+        <c:grouping val="clustered"/>
+        <c:varyColors val="0"/>
+        <c:ser>
+          <c:idx val="0"/>
+          <c:order val="0"/>
+          <c:tx>
+            <c:strRef>
+              <c:f>'Time Complexity (ED)'!$A$3</c:f>
+              <c:strCache>
+                <c:ptCount val="1"/>
+                <c:pt idx="0">
+                  <c:v>Levenshtein's Distance</c:v>
+                </c:pt>
+              </c:strCache>
+            </c:strRef>
+          </c:tx>
+          <c:spPr>
+            <a:solidFill>
+              <a:schemeClr val="accent2"/>
+            </a:solidFill>
+            <a:ln>
+              <a:noFill/>
+            </a:ln>
+            <a:effectLst/>
+          </c:spPr>
+          <c:invertIfNegative val="0"/>
+          <c:cat>
+            <c:strRef>
+              <c:f>'Time Complexity (ED)'!$B$2:$D$2</c:f>
+              <c:strCache>
+                <c:ptCount val="3"/>
+                <c:pt idx="0">
+                  <c:v>Greg</c:v>
+                </c:pt>
+                <c:pt idx="1">
+                  <c:v>Kevin</c:v>
+                </c:pt>
+                <c:pt idx="2">
+                  <c:v>Marlene</c:v>
+                </c:pt>
+              </c:strCache>
+            </c:strRef>
+          </c:cat>
+          <c:val>
+            <c:numRef>
+              <c:f>'Time Complexity (ED)'!$B$3:$D$3</c:f>
+              <c:numCache>
+                <c:formatCode>General</c:formatCode>
+                <c:ptCount val="3"/>
+                <c:pt idx="0">
+                  <c:v>3.7692866999999998E-2</c:v>
+                </c:pt>
+                <c:pt idx="1">
+                  <c:v>3.3205800000000001E-2</c:v>
+                </c:pt>
+                <c:pt idx="2">
+                  <c:v>3.6413833333333333E-2</c:v>
+                </c:pt>
+              </c:numCache>
+            </c:numRef>
+          </c:val>
+        </c:ser>
+        <c:ser>
+          <c:idx val="1"/>
+          <c:order val="1"/>
+          <c:tx>
+            <c:strRef>
+              <c:f>'Time Complexity (ED)'!$A$6</c:f>
+              <c:strCache>
+                <c:ptCount val="1"/>
+                <c:pt idx="0">
+                  <c:v>Needleman-Wunsch Distance</c:v>
+                </c:pt>
+              </c:strCache>
+            </c:strRef>
+          </c:tx>
+          <c:spPr>
+            <a:solidFill>
+              <a:schemeClr val="accent4"/>
+            </a:solidFill>
+            <a:ln>
+              <a:noFill/>
+            </a:ln>
+            <a:effectLst/>
+          </c:spPr>
+          <c:invertIfNegative val="0"/>
+          <c:cat>
+            <c:strRef>
+              <c:f>'Time Complexity (ED)'!$B$2:$D$2</c:f>
+              <c:strCache>
+                <c:ptCount val="3"/>
+                <c:pt idx="0">
+                  <c:v>Greg</c:v>
+                </c:pt>
+                <c:pt idx="1">
+                  <c:v>Kevin</c:v>
+                </c:pt>
+                <c:pt idx="2">
+                  <c:v>Marlene</c:v>
+                </c:pt>
+              </c:strCache>
+            </c:strRef>
+          </c:cat>
+          <c:val>
+            <c:numRef>
+              <c:f>'Time Complexity (ED)'!$B$6:$D$6</c:f>
+              <c:numCache>
+                <c:formatCode>General</c:formatCode>
+                <c:ptCount val="3"/>
+                <c:pt idx="0">
+                  <c:v>4.55319E-2</c:v>
+                </c:pt>
+                <c:pt idx="1">
+                  <c:v>2.5718100000000004E-2</c:v>
+                </c:pt>
+                <c:pt idx="2">
+                  <c:v>2.3410799999999999E-2</c:v>
+                </c:pt>
+              </c:numCache>
+            </c:numRef>
+          </c:val>
+        </c:ser>
+        <c:dLbls>
+          <c:showLegendKey val="0"/>
+          <c:showVal val="0"/>
+          <c:showCatName val="0"/>
+          <c:showSerName val="0"/>
+          <c:showPercent val="0"/>
+          <c:showBubbleSize val="0"/>
+        </c:dLbls>
+        <c:gapWidth val="150"/>
+        <c:axId val="52188672"/>
+        <c:axId val="74178560"/>
+      </c:barChart>
+      <c:catAx>
+        <c:axId val="52188672"/>
+        <c:scaling>
+          <c:orientation val="minMax"/>
+        </c:scaling>
+        <c:delete val="0"/>
+        <c:axPos val="b"/>
+        <c:numFmt formatCode="General" sourceLinked="1"/>
+        <c:majorTickMark val="none"/>
+        <c:minorTickMark val="none"/>
+        <c:tickLblPos val="nextTo"/>
+        <c:spPr>
+          <a:noFill/>
+          <a:ln w="9525" cap="flat" cmpd="sng" algn="ctr">
+            <a:solidFill>
+              <a:schemeClr val="tx1">
+                <a:lumMod val="15000"/>
+                <a:lumOff val="85000"/>
+              </a:schemeClr>
+            </a:solidFill>
+            <a:round/>
+          </a:ln>
+          <a:effectLst/>
+        </c:spPr>
+        <c:txPr>
+          <a:bodyPr rot="-60000000" spcFirstLastPara="1" vertOverflow="ellipsis" vert="horz" wrap="square" anchor="ctr" anchorCtr="1"/>
+          <a:lstStyle/>
+          <a:p>
+            <a:pPr>
+              <a:defRPr sz="900" b="0" i="0" u="none" strike="noStrike" kern="1200" baseline="0">
+                <a:solidFill>
+                  <a:schemeClr val="tx1">
+                    <a:lumMod val="65000"/>
+                    <a:lumOff val="35000"/>
+                  </a:schemeClr>
+                </a:solidFill>
+                <a:latin typeface="+mn-lt"/>
+                <a:ea typeface="+mn-ea"/>
+                <a:cs typeface="+mn-cs"/>
+              </a:defRPr>
+            </a:pPr>
+            <a:endParaRPr lang="en-US"/>
+          </a:p>
+        </c:txPr>
+        <c:crossAx val="74178560"/>
+        <c:crosses val="autoZero"/>
+        <c:auto val="1"/>
+        <c:lblAlgn val="ctr"/>
+        <c:lblOffset val="100"/>
+        <c:noMultiLvlLbl val="0"/>
+      </c:catAx>
+      <c:valAx>
+        <c:axId val="74178560"/>
+        <c:scaling>
+          <c:orientation val="minMax"/>
+        </c:scaling>
+        <c:delete val="0"/>
+        <c:axPos val="l"/>
+        <c:majorGridlines>
+          <c:spPr>
+            <a:ln w="9525" cap="flat" cmpd="sng" algn="ctr">
+              <a:solidFill>
+                <a:schemeClr val="tx1">
+                  <a:lumMod val="15000"/>
+                  <a:lumOff val="85000"/>
+                </a:schemeClr>
+              </a:solidFill>
+              <a:round/>
+            </a:ln>
+            <a:effectLst/>
+          </c:spPr>
+        </c:majorGridlines>
+        <c:title>
+          <c:tx>
+            <c:rich>
+              <a:bodyPr rot="-5400000" spcFirstLastPara="1" vertOverflow="ellipsis" vert="horz" wrap="square" anchor="ctr" anchorCtr="1"/>
+              <a:lstStyle/>
+              <a:p>
+                <a:pPr>
+                  <a:defRPr sz="1000" b="0" i="0" u="none" strike="noStrike" kern="1200" baseline="0">
+                    <a:solidFill>
+                      <a:schemeClr val="tx1">
+                        <a:lumMod val="65000"/>
+                        <a:lumOff val="35000"/>
+                      </a:schemeClr>
+                    </a:solidFill>
+                    <a:latin typeface="+mn-lt"/>
+                    <a:ea typeface="+mn-ea"/>
+                    <a:cs typeface="+mn-cs"/>
+                  </a:defRPr>
+                </a:pPr>
+                <a:r>
+                  <a:rPr lang="en-US"/>
+                  <a:t>Run-time in Seconds</a:t>
+                </a:r>
+              </a:p>
+            </c:rich>
+          </c:tx>
+          <c:layout/>
+          <c:overlay val="0"/>
+          <c:spPr>
+            <a:noFill/>
+            <a:ln>
+              <a:noFill/>
+            </a:ln>
+            <a:effectLst/>
+          </c:spPr>
+        </c:title>
+        <c:numFmt formatCode="General" sourceLinked="1"/>
+        <c:majorTickMark val="none"/>
+        <c:minorTickMark val="none"/>
+        <c:tickLblPos val="nextTo"/>
+        <c:spPr>
+          <a:noFill/>
+          <a:ln>
+            <a:noFill/>
+          </a:ln>
+          <a:effectLst/>
+        </c:spPr>
+        <c:txPr>
+          <a:bodyPr rot="-60000000" spcFirstLastPara="1" vertOverflow="ellipsis" vert="horz" wrap="square" anchor="ctr" anchorCtr="1"/>
+          <a:lstStyle/>
+          <a:p>
+            <a:pPr>
+              <a:defRPr sz="900" b="0" i="0" u="none" strike="noStrike" kern="1200" baseline="0">
+                <a:solidFill>
+                  <a:schemeClr val="tx1">
+                    <a:lumMod val="65000"/>
+                    <a:lumOff val="35000"/>
+                  </a:schemeClr>
+                </a:solidFill>
+                <a:latin typeface="+mn-lt"/>
+                <a:ea typeface="+mn-ea"/>
+                <a:cs typeface="+mn-cs"/>
+              </a:defRPr>
+            </a:pPr>
+            <a:endParaRPr lang="en-US"/>
+          </a:p>
+        </c:txPr>
+        <c:crossAx val="52188672"/>
+        <c:crosses val="autoZero"/>
+        <c:crossBetween val="between"/>
+      </c:valAx>
+      <c:dTable>
+        <c:showHorzBorder val="1"/>
+        <c:showVertBorder val="1"/>
+        <c:showOutline val="1"/>
+        <c:showKeys val="1"/>
+        <c:spPr>
+          <a:noFill/>
+          <a:ln w="9525" cap="flat" cmpd="sng" algn="ctr">
+            <a:solidFill>
+              <a:schemeClr val="tx1">
+                <a:lumMod val="15000"/>
+                <a:lumOff val="85000"/>
+              </a:schemeClr>
+            </a:solidFill>
+            <a:round/>
+          </a:ln>
+          <a:effectLst/>
+        </c:spPr>
+        <c:txPr>
+          <a:bodyPr rot="0" spcFirstLastPara="1" vertOverflow="ellipsis" vert="horz" wrap="square" anchor="ctr" anchorCtr="1"/>
+          <a:lstStyle/>
+          <a:p>
+            <a:pPr rtl="0">
+              <a:defRPr sz="900" b="0" i="0" u="none" strike="noStrike" kern="1200" baseline="0">
+                <a:solidFill>
+                  <a:schemeClr val="tx1">
+                    <a:lumMod val="65000"/>
+                    <a:lumOff val="35000"/>
+                  </a:schemeClr>
+                </a:solidFill>
+                <a:latin typeface="+mn-lt"/>
+                <a:ea typeface="+mn-ea"/>
+                <a:cs typeface="+mn-cs"/>
+              </a:defRPr>
+            </a:pPr>
+            <a:endParaRPr lang="en-US"/>
+          </a:p>
+        </c:txPr>
+      </c:dTable>
+      <c:spPr>
+        <a:noFill/>
+        <a:ln>
+          <a:noFill/>
+        </a:ln>
+        <a:effectLst/>
+      </c:spPr>
+    </c:plotArea>
+    <c:plotVisOnly val="1"/>
+    <c:dispBlanksAs val="gap"/>
+    <c:showDLblsOverMax val="0"/>
+  </c:chart>
+  <c:spPr>
+    <a:solidFill>
+      <a:schemeClr val="bg1"/>
+    </a:solidFill>
+    <a:ln w="9525" cap="flat" cmpd="sng" algn="ctr">
+      <a:solidFill>
+        <a:schemeClr val="tx1">
+          <a:lumMod val="15000"/>
+          <a:lumOff val="85000"/>
+        </a:schemeClr>
+      </a:solidFill>
+      <a:round/>
     </a:ln>
     <a:effectLst/>
   </c:spPr>
@@ -760,11 +2503,11 @@
         </c:dLbls>
         <c:gapWidth val="100"/>
         <c:overlap val="-24"/>
-        <c:axId val="65871360"/>
-        <c:axId val="52521792"/>
+        <c:axId val="124006912"/>
+        <c:axId val="94977344"/>
       </c:barChart>
       <c:catAx>
-        <c:axId val="65871360"/>
+        <c:axId val="124006912"/>
         <c:scaling>
           <c:orientation val="minMax"/>
         </c:scaling>
@@ -806,7 +2549,7 @@
             <a:endParaRPr lang="en-US"/>
           </a:p>
         </c:txPr>
-        <c:crossAx val="52521792"/>
+        <c:crossAx val="94977344"/>
         <c:crosses val="autoZero"/>
         <c:auto val="1"/>
         <c:lblAlgn val="ctr"/>
@@ -814,7 +2557,7 @@
         <c:noMultiLvlLbl val="0"/>
       </c:catAx>
       <c:valAx>
-        <c:axId val="52521792"/>
+        <c:axId val="94977344"/>
         <c:scaling>
           <c:orientation val="minMax"/>
         </c:scaling>
@@ -864,7 +2607,7 @@
             <a:endParaRPr lang="en-US"/>
           </a:p>
         </c:txPr>
-        <c:crossAx val="65871360"/>
+        <c:crossAx val="124006912"/>
         <c:crosses val="autoZero"/>
         <c:crossBetween val="between"/>
       </c:valAx>
@@ -1160,11 +2903,11 @@
         </c:dLbls>
         <c:gapWidth val="75"/>
         <c:overlap val="-25"/>
-        <c:axId val="66143232"/>
-        <c:axId val="66121664"/>
+        <c:axId val="124007424"/>
+        <c:axId val="73811072"/>
       </c:barChart>
       <c:catAx>
-        <c:axId val="66143232"/>
+        <c:axId val="124007424"/>
         <c:scaling>
           <c:orientation val="minMax"/>
         </c:scaling>
@@ -1206,7 +2949,7 @@
             <a:endParaRPr lang="en-US"/>
           </a:p>
         </c:txPr>
-        <c:crossAx val="66121664"/>
+        <c:crossAx val="73811072"/>
         <c:crosses val="autoZero"/>
         <c:auto val="1"/>
         <c:lblAlgn val="ctr"/>
@@ -1214,7 +2957,7 @@
         <c:noMultiLvlLbl val="0"/>
       </c:catAx>
       <c:valAx>
-        <c:axId val="66121664"/>
+        <c:axId val="73811072"/>
         <c:scaling>
           <c:orientation val="minMax"/>
         </c:scaling>
@@ -1264,7 +3007,7 @@
             <a:endParaRPr lang="en-US"/>
           </a:p>
         </c:txPr>
-        <c:crossAx val="66143232"/>
+        <c:crossAx val="124007424"/>
         <c:crosses val="autoZero"/>
         <c:crossBetween val="between"/>
       </c:valAx>
@@ -1546,11 +3289,11 @@
           <c:showBubbleSize val="0"/>
         </c:dLbls>
         <c:gapWidth val="150"/>
-        <c:axId val="82942976"/>
-        <c:axId val="82544320"/>
+        <c:axId val="74481664"/>
+        <c:axId val="73812800"/>
       </c:barChart>
       <c:catAx>
-        <c:axId val="82942976"/>
+        <c:axId val="74481664"/>
         <c:scaling>
           <c:orientation val="minMax"/>
         </c:scaling>
@@ -1593,7 +3336,7 @@
             <a:endParaRPr lang="en-US"/>
           </a:p>
         </c:txPr>
-        <c:crossAx val="82544320"/>
+        <c:crossAx val="73812800"/>
         <c:crosses val="autoZero"/>
         <c:auto val="1"/>
         <c:lblAlgn val="ctr"/>
@@ -1601,7 +3344,7 @@
         <c:noMultiLvlLbl val="0"/>
       </c:catAx>
       <c:valAx>
-        <c:axId val="82544320"/>
+        <c:axId val="73812800"/>
         <c:scaling>
           <c:orientation val="minMax"/>
         </c:scaling>
@@ -1688,7 +3431,7 @@
             <a:endParaRPr lang="en-US"/>
           </a:p>
         </c:txPr>
-        <c:crossAx val="82942976"/>
+        <c:crossAx val="74481664"/>
         <c:crosses val="autoZero"/>
         <c:crossBetween val="between"/>
       </c:valAx>
@@ -1913,11 +3656,11 @@
           <c:showBubbleSize val="0"/>
         </c:dLbls>
         <c:gapWidth val="150"/>
-        <c:axId val="88781312"/>
-        <c:axId val="82549504"/>
+        <c:axId val="74341888"/>
+        <c:axId val="73814528"/>
       </c:barChart>
       <c:catAx>
-        <c:axId val="88781312"/>
+        <c:axId val="74341888"/>
         <c:scaling>
           <c:orientation val="minMax"/>
         </c:scaling>
@@ -1960,7 +3703,7 @@
             <a:endParaRPr lang="en-US"/>
           </a:p>
         </c:txPr>
-        <c:crossAx val="82549504"/>
+        <c:crossAx val="73814528"/>
         <c:crosses val="autoZero"/>
         <c:auto val="1"/>
         <c:lblAlgn val="ctr"/>
@@ -1968,7 +3711,7 @@
         <c:noMultiLvlLbl val="0"/>
       </c:catAx>
       <c:valAx>
-        <c:axId val="82549504"/>
+        <c:axId val="73814528"/>
         <c:scaling>
           <c:orientation val="minMax"/>
         </c:scaling>
@@ -2055,7 +3798,7 @@
             <a:endParaRPr lang="en-US"/>
           </a:p>
         </c:txPr>
-        <c:crossAx val="88781312"/>
+        <c:crossAx val="74341888"/>
         <c:crosses val="autoZero"/>
         <c:crossBetween val="between"/>
       </c:valAx>
@@ -2408,11 +4151,11 @@
         </c:dLbls>
         <c:gapWidth val="100"/>
         <c:overlap val="-24"/>
-        <c:axId val="121084416"/>
-        <c:axId val="89142912"/>
+        <c:axId val="74339328"/>
+        <c:axId val="73817408"/>
       </c:barChart>
       <c:catAx>
-        <c:axId val="121084416"/>
+        <c:axId val="74339328"/>
         <c:scaling>
           <c:orientation val="minMax"/>
         </c:scaling>
@@ -2454,7 +4197,7 @@
             <a:endParaRPr lang="en-US"/>
           </a:p>
         </c:txPr>
-        <c:crossAx val="89142912"/>
+        <c:crossAx val="73817408"/>
         <c:crosses val="autoZero"/>
         <c:auto val="1"/>
         <c:lblAlgn val="ctr"/>
@@ -2462,7 +4205,7 @@
         <c:noMultiLvlLbl val="0"/>
       </c:catAx>
       <c:valAx>
-        <c:axId val="89142912"/>
+        <c:axId val="73817408"/>
         <c:scaling>
           <c:orientation val="minMax"/>
         </c:scaling>
@@ -2512,7 +4255,7 @@
             <a:endParaRPr lang="en-US"/>
           </a:p>
         </c:txPr>
-        <c:crossAx val="121084416"/>
+        <c:crossAx val="74339328"/>
         <c:crosses val="autoZero"/>
         <c:crossBetween val="between"/>
       </c:valAx>
@@ -2776,11 +4519,11 @@
           <c:showBubbleSize val="0"/>
         </c:dLbls>
         <c:gapWidth val="115"/>
-        <c:axId val="64278528"/>
-        <c:axId val="89144640"/>
+        <c:axId val="74339840"/>
+        <c:axId val="74982528"/>
       </c:barChart>
       <c:catAx>
-        <c:axId val="64278528"/>
+        <c:axId val="74339840"/>
         <c:scaling>
           <c:orientation val="minMax"/>
         </c:scaling>
@@ -2822,7 +4565,7 @@
             <a:endParaRPr lang="en-US"/>
           </a:p>
         </c:txPr>
-        <c:crossAx val="89144640"/>
+        <c:crossAx val="74982528"/>
         <c:crosses val="autoZero"/>
         <c:auto val="1"/>
         <c:lblAlgn val="ctr"/>
@@ -2830,7 +4573,7 @@
         <c:noMultiLvlLbl val="0"/>
       </c:catAx>
       <c:valAx>
-        <c:axId val="89144640"/>
+        <c:axId val="74982528"/>
         <c:scaling>
           <c:orientation val="minMax"/>
         </c:scaling>
@@ -2880,7 +4623,7 @@
             <a:endParaRPr lang="en-US"/>
           </a:p>
         </c:txPr>
-        <c:crossAx val="64278528"/>
+        <c:crossAx val="74339840"/>
         <c:crosses val="autoZero"/>
         <c:crossBetween val="between"/>
       </c:valAx>
@@ -3144,11 +4887,11 @@
           <c:showBubbleSize val="0"/>
         </c:dLbls>
         <c:gapWidth val="115"/>
-        <c:axId val="64279040"/>
-        <c:axId val="120956032"/>
+        <c:axId val="74340352"/>
+        <c:axId val="74984256"/>
       </c:barChart>
       <c:catAx>
-        <c:axId val="64279040"/>
+        <c:axId val="74340352"/>
         <c:scaling>
           <c:orientation val="minMax"/>
         </c:scaling>
@@ -3190,7 +4933,7 @@
             <a:endParaRPr lang="en-US"/>
           </a:p>
         </c:txPr>
-        <c:crossAx val="120956032"/>
+        <c:crossAx val="74984256"/>
         <c:crosses val="autoZero"/>
         <c:auto val="1"/>
         <c:lblAlgn val="ctr"/>
@@ -3198,7 +4941,7 @@
         <c:noMultiLvlLbl val="0"/>
       </c:catAx>
       <c:valAx>
-        <c:axId val="120956032"/>
+        <c:axId val="74984256"/>
         <c:scaling>
           <c:orientation val="minMax"/>
         </c:scaling>
@@ -3248,7 +4991,7 @@
             <a:endParaRPr lang="en-US"/>
           </a:p>
         </c:txPr>
-        <c:crossAx val="64279040"/>
+        <c:crossAx val="74340352"/>
         <c:crosses val="autoZero"/>
         <c:crossBetween val="between"/>
       </c:valAx>
@@ -3499,11 +5242,11 @@
           <c:showBubbleSize val="0"/>
         </c:dLbls>
         <c:gapWidth val="150"/>
-        <c:axId val="43046400"/>
-        <c:axId val="120963072"/>
+        <c:axId val="48702976"/>
+        <c:axId val="73837952"/>
       </c:barChart>
       <c:catAx>
-        <c:axId val="43046400"/>
+        <c:axId val="48702976"/>
         <c:scaling>
           <c:orientation val="minMax"/>
         </c:scaling>
@@ -3546,7 +5289,7 @@
             <a:endParaRPr lang="en-US"/>
           </a:p>
         </c:txPr>
-        <c:crossAx val="120963072"/>
+        <c:crossAx val="73837952"/>
         <c:crosses val="autoZero"/>
         <c:auto val="1"/>
         <c:lblAlgn val="ctr"/>
@@ -3554,7 +5297,7 @@
         <c:noMultiLvlLbl val="0"/>
       </c:catAx>
       <c:valAx>
-        <c:axId val="120963072"/>
+        <c:axId val="73837952"/>
         <c:scaling>
           <c:orientation val="minMax"/>
         </c:scaling>
@@ -3641,7 +5384,7 @@
             <a:endParaRPr lang="en-US"/>
           </a:p>
         </c:txPr>
-        <c:crossAx val="43046400"/>
+        <c:crossAx val="48702976"/>
         <c:crosses val="autoZero"/>
         <c:crossBetween val="between"/>
       </c:valAx>
@@ -13593,11 +15336,7 @@
           <a:p>
             <a:r>
               <a:rPr lang="en-US" dirty="0" smtClean="0"/>
-              <a:t>Using Marlene’s </a:t>
-            </a:r>
-            <a:r>
-              <a:rPr lang="en-US" dirty="0" smtClean="0"/>
-              <a:t>Input</a:t>
+              <a:t>Using Marlene’s Input</a:t>
             </a:r>
             <a:endParaRPr lang="en-US" dirty="0"/>
           </a:p>
@@ -13814,7 +15553,7 @@
       </p:grpSpPr>
       <p:sp>
         <p:nvSpPr>
-          <p:cNvPr id="4" name="Title 3"/>
+          <p:cNvPr id="2" name="Title 1"/>
           <p:cNvSpPr>
             <a:spLocks noGrp="1"/>
           </p:cNvSpPr>
@@ -13829,15 +15568,15 @@
           <a:p>
             <a:r>
               <a:rPr lang="en-US" dirty="0" smtClean="0"/>
-              <a:t>Needleman-</a:t>
-            </a:r>
-            <a:r>
-              <a:rPr lang="en-US" dirty="0" err="1" smtClean="0"/>
-              <a:t>Wunsch</a:t>
+              <a:t>Needleman-Wunsch</a:t>
             </a:r>
             <a:r>
               <a:rPr lang="en-US" dirty="0" smtClean="0"/>
-              <a:t> Algorithm</a:t>
+              <a:t> </a:t>
+            </a:r>
+            <a:r>
+              <a:rPr lang="en-US" dirty="0" smtClean="0"/>
+              <a:t>Algorithm</a:t>
             </a:r>
             <a:endParaRPr lang="en-US" dirty="0"/>
           </a:p>
@@ -13845,12 +15584,12 @@
       </p:sp>
       <p:sp>
         <p:nvSpPr>
-          <p:cNvPr id="5" name="Content Placeholder 4"/>
+          <p:cNvPr id="3" name="Content Placeholder 2"/>
           <p:cNvSpPr>
             <a:spLocks noGrp="1"/>
           </p:cNvSpPr>
           <p:nvPr>
-            <p:ph sz="half" idx="1"/>
+            <p:ph idx="1"/>
           </p:nvPr>
         </p:nvSpPr>
         <p:spPr/>
@@ -13858,33 +15597,79 @@
           <a:bodyPr/>
           <a:lstStyle/>
           <a:p>
-            <a:endParaRPr lang="en-US"/>
-          </a:p>
-        </p:txBody>
-      </p:sp>
-      <p:sp>
-        <p:nvSpPr>
-          <p:cNvPr id="6" name="Content Placeholder 5"/>
-          <p:cNvSpPr>
-            <a:spLocks noGrp="1"/>
-          </p:cNvSpPr>
-          <p:nvPr>
-            <p:ph sz="half" idx="2"/>
-          </p:nvPr>
-        </p:nvSpPr>
-        <p:spPr/>
-        <p:txBody>
-          <a:bodyPr/>
-          <a:lstStyle/>
-          <a:p>
-            <a:endParaRPr lang="en-US"/>
+            <a:r>
+              <a:rPr lang="en-US" dirty="0" smtClean="0"/>
+              <a:t>Developed by </a:t>
+            </a:r>
+          </a:p>
+          <a:p>
+            <a:pPr lvl="1"/>
+            <a:r>
+              <a:rPr lang="en-US" strike="dblStrike" dirty="0" smtClean="0"/>
+              <a:t>Matthew A. Jaro – System Automation Corp./</a:t>
+            </a:r>
+            <a:r>
+              <a:rPr lang="en-US" strike="dblStrike" dirty="0" err="1" smtClean="0"/>
+              <a:t>MatchWare</a:t>
+            </a:r>
+            <a:r>
+              <a:rPr lang="en-US" strike="dblStrike" dirty="0" smtClean="0"/>
+              <a:t> Technologies, Inc.</a:t>
+            </a:r>
+          </a:p>
+          <a:p>
+            <a:pPr lvl="1"/>
+            <a:r>
+              <a:rPr lang="en-US" strike="dblStrike" dirty="0" smtClean="0"/>
+              <a:t>Bill Winkler – U.S. Bureau of the Census</a:t>
+            </a:r>
+          </a:p>
+          <a:p>
+            <a:r>
+              <a:rPr lang="en-US" dirty="0" smtClean="0"/>
+              <a:t>Published in</a:t>
+            </a:r>
+          </a:p>
+          <a:p>
+            <a:pPr lvl="1"/>
+            <a:r>
+              <a:rPr lang="en-US" strike="dblStrike" dirty="0" smtClean="0"/>
+              <a:t>Proceedings of the Section on Survey Research Methods (ASA) pp. 354-359</a:t>
+            </a:r>
+          </a:p>
+          <a:p>
+            <a:pPr lvl="1"/>
+            <a:r>
+              <a:rPr lang="en-US" u="sng" strike="dblStrike" dirty="0" smtClean="0"/>
+              <a:t>String </a:t>
+            </a:r>
+            <a:r>
+              <a:rPr lang="en-US" u="sng" strike="dblStrike" dirty="0"/>
+              <a:t>Comparator Metrics and Enhanced Decision Rules in the </a:t>
+            </a:r>
+            <a:r>
+              <a:rPr lang="en-US" u="sng" strike="dblStrike" dirty="0" err="1"/>
+              <a:t>Fellegi-Sunter</a:t>
+            </a:r>
+            <a:r>
+              <a:rPr lang="en-US" u="sng" strike="dblStrike" dirty="0"/>
+              <a:t>  Model of Record Linkage</a:t>
+            </a:r>
+          </a:p>
+          <a:p>
+            <a:pPr lvl="1"/>
+            <a:r>
+              <a:rPr lang="en-US" strike="dblStrike" dirty="0" smtClean="0"/>
+              <a:t>1990</a:t>
+            </a:r>
+            <a:endParaRPr lang="en-US" strike="dblStrike" dirty="0"/>
           </a:p>
         </p:txBody>
       </p:sp>
     </p:spTree>
     <p:extLst>
       <p:ext uri="{BB962C8B-B14F-4D97-AF65-F5344CB8AC3E}">
-        <p14:creationId xmlns:p14="http://schemas.microsoft.com/office/powerpoint/2010/main" val="1911095607"/>
+        <p14:creationId xmlns:p14="http://schemas.microsoft.com/office/powerpoint/2010/main" val="1589292279"/>
       </p:ext>
     </p:extLst>
   </p:cSld>
@@ -13913,7 +15698,7 @@
       </p:grpSpPr>
       <p:sp>
         <p:nvSpPr>
-          <p:cNvPr id="2" name="Title 1"/>
+          <p:cNvPr id="7" name="Title 6"/>
           <p:cNvSpPr>
             <a:spLocks noGrp="1"/>
           </p:cNvSpPr>
@@ -13928,16 +15713,618 @@
           <a:p>
             <a:r>
               <a:rPr lang="en-US" dirty="0" smtClean="0"/>
-              <a:t>Time Complexity</a:t>
+              <a:t>How </a:t>
+            </a:r>
+            <a:r>
+              <a:rPr lang="en-US" dirty="0" smtClean="0"/>
+              <a:t>Needleman-Wunsch </a:t>
+            </a:r>
+            <a:r>
+              <a:rPr lang="en-US" dirty="0" smtClean="0"/>
+              <a:t>works</a:t>
             </a:r>
             <a:endParaRPr lang="en-US" dirty="0"/>
           </a:p>
         </p:txBody>
       </p:sp>
+      <p:sp>
+        <p:nvSpPr>
+          <p:cNvPr id="8" name="Content Placeholder 7"/>
+          <p:cNvSpPr>
+            <a:spLocks noGrp="1"/>
+          </p:cNvSpPr>
+          <p:nvPr>
+            <p:ph idx="1"/>
+          </p:nvPr>
+        </p:nvSpPr>
+        <p:spPr>
+          <a:xfrm>
+            <a:off x="2589212" y="1473199"/>
+            <a:ext cx="9122142" cy="4892432"/>
+          </a:xfrm>
+        </p:spPr>
+        <p:txBody>
+          <a:bodyPr>
+            <a:normAutofit/>
+          </a:bodyPr>
+          <a:lstStyle/>
+          <a:p>
+            <a:r>
+              <a:rPr lang="en-US" strike="dblStrike" dirty="0" smtClean="0"/>
+              <a:t>Jaro-Winkler requires two parts </a:t>
+            </a:r>
+            <a:endParaRPr lang="en-US" strike="dblStrike" dirty="0" smtClean="0">
+              <a:solidFill>
+                <a:schemeClr val="accent1"/>
+              </a:solidFill>
+            </a:endParaRPr>
+          </a:p>
+          <a:p>
+            <a:pPr marL="800100" lvl="1" indent="-342900">
+              <a:buFont typeface="+mj-lt"/>
+              <a:buAutoNum type="arabicPeriod"/>
+            </a:pPr>
+            <a:r>
+              <a:rPr lang="en-US" strike="dblStrike" dirty="0" smtClean="0"/>
+              <a:t>Obtain the Jaro score of two strings being compared </a:t>
+            </a:r>
+          </a:p>
+          <a:p>
+            <a:pPr marL="857250" lvl="2" indent="0">
+              <a:buNone/>
+            </a:pPr>
+            <a:endParaRPr lang="en-US" strike="dblStrike" dirty="0" smtClean="0"/>
+          </a:p>
+          <a:p>
+            <a:pPr marL="4000500" lvl="8" indent="-285750"/>
+            <a:endParaRPr lang="en-US" strike="dblStrike" dirty="0" smtClean="0"/>
+          </a:p>
+          <a:p>
+            <a:pPr marL="1200150" lvl="2" indent="-342900">
+              <a:buFont typeface="+mj-lt"/>
+              <a:buAutoNum type="arabicPeriod"/>
+            </a:pPr>
+            <a:r>
+              <a:rPr lang="en-US" strike="dblStrike" dirty="0" smtClean="0"/>
+              <a:t>Where matches (m) are within the range shown below and transpositions (t) are counted </a:t>
+            </a:r>
+          </a:p>
+          <a:p>
+            <a:pPr marL="800100" lvl="1" indent="-342900">
+              <a:buFont typeface="+mj-lt"/>
+              <a:buAutoNum type="arabicPeriod"/>
+            </a:pPr>
+            <a:endParaRPr lang="en-US" strike="dblStrike" dirty="0" smtClean="0"/>
+          </a:p>
+          <a:p>
+            <a:pPr marL="800100" lvl="1" indent="-342900">
+              <a:buFont typeface="+mj-lt"/>
+              <a:buAutoNum type="arabicPeriod"/>
+            </a:pPr>
+            <a:r>
+              <a:rPr lang="en-US" strike="dblStrike" dirty="0" smtClean="0"/>
+              <a:t>Obtain Jaro-Winkler score by determining if arbitrary boost threshold is met and apply boost prefix if so:</a:t>
+            </a:r>
+          </a:p>
+          <a:p>
+            <a:pPr marL="800100" lvl="1" indent="-342900">
+              <a:buFont typeface="+mj-lt"/>
+              <a:buAutoNum type="arabicPeriod"/>
+            </a:pPr>
+            <a:endParaRPr lang="en-US" strike="dblStrike" dirty="0" smtClean="0"/>
+          </a:p>
+          <a:p>
+            <a:pPr marL="800100" lvl="1" indent="-342900">
+              <a:buFont typeface="+mj-lt"/>
+              <a:buAutoNum type="arabicPeriod"/>
+            </a:pPr>
+            <a:endParaRPr lang="en-US" strike="dblStrike" dirty="0"/>
+          </a:p>
+          <a:p>
+            <a:pPr marL="1200150" lvl="2" indent="-342900">
+              <a:buFont typeface="+mj-lt"/>
+              <a:buAutoNum type="arabicPeriod"/>
+            </a:pPr>
+            <a:r>
+              <a:rPr lang="en-US" strike="dblStrike" dirty="0" smtClean="0"/>
+              <a:t>Where l is the length of the common prefix of the strings and p is a constant scaling factor</a:t>
+            </a:r>
+          </a:p>
+          <a:p>
+            <a:pPr marL="1200150" lvl="2" indent="-342900">
+              <a:buFont typeface="+mj-lt"/>
+              <a:buAutoNum type="arabicPeriod"/>
+            </a:pPr>
+            <a:r>
+              <a:rPr lang="en-US" strike="dblStrike" dirty="0" smtClean="0"/>
+              <a:t>Some implementations do not make use of the boost threshold and would always fall in the otherwise formula</a:t>
+            </a:r>
+            <a:endParaRPr lang="en-US" strike="dblStrike" dirty="0"/>
+          </a:p>
+        </p:txBody>
+      </p:sp>
+      <p:pic>
+        <p:nvPicPr>
+          <p:cNvPr id="1026" name="Picture 2"/>
+          <p:cNvPicPr>
+            <a:picLocks noChangeAspect="1" noChangeArrowheads="1"/>
+          </p:cNvPicPr>
+          <p:nvPr/>
+        </p:nvPicPr>
+        <p:blipFill>
+          <a:blip r:embed="rId2">
+            <a:extLst>
+              <a:ext uri="{28A0092B-C50C-407E-A947-70E740481C1C}">
+                <a14:useLocalDpi xmlns:a14="http://schemas.microsoft.com/office/drawing/2010/main" val="0"/>
+              </a:ext>
+            </a:extLst>
+          </a:blip>
+          <a:srcRect/>
+          <a:stretch>
+            <a:fillRect/>
+          </a:stretch>
+        </p:blipFill>
+        <p:spPr bwMode="auto">
+          <a:xfrm>
+            <a:off x="4341266" y="2174997"/>
+            <a:ext cx="3333750" cy="714375"/>
+          </a:xfrm>
+          <a:prstGeom prst="rect">
+            <a:avLst/>
+          </a:prstGeom>
+          <a:noFill/>
+          <a:ln>
+            <a:noFill/>
+          </a:ln>
+          <a:extLst>
+            <a:ext uri="{909E8E84-426E-40DD-AFC4-6F175D3DCCD1}">
+              <a14:hiddenFill xmlns:a14="http://schemas.microsoft.com/office/drawing/2010/main">
+                <a:solidFill>
+                  <a:schemeClr val="accent1"/>
+                </a:solidFill>
+              </a14:hiddenFill>
+            </a:ext>
+            <a:ext uri="{91240B29-F687-4F45-9708-019B960494DF}">
+              <a14:hiddenLine xmlns:a14="http://schemas.microsoft.com/office/drawing/2010/main" w="9525">
+                <a:solidFill>
+                  <a:schemeClr val="tx1"/>
+                </a:solidFill>
+                <a:miter lim="800000"/>
+                <a:headEnd/>
+                <a:tailEnd/>
+              </a14:hiddenLine>
+            </a:ext>
+          </a:extLst>
+        </p:spPr>
+      </p:pic>
+      <p:pic>
+        <p:nvPicPr>
+          <p:cNvPr id="6" name="Picture 3"/>
+          <p:cNvPicPr>
+            <a:picLocks noChangeAspect="1" noChangeArrowheads="1"/>
+          </p:cNvPicPr>
+          <p:nvPr/>
+        </p:nvPicPr>
+        <p:blipFill>
+          <a:blip r:embed="rId3">
+            <a:extLst>
+              <a:ext uri="{28A0092B-C50C-407E-A947-70E740481C1C}">
+                <a14:useLocalDpi xmlns:a14="http://schemas.microsoft.com/office/drawing/2010/main" val="0"/>
+              </a:ext>
+            </a:extLst>
+          </a:blip>
+          <a:srcRect/>
+          <a:stretch>
+            <a:fillRect/>
+          </a:stretch>
+        </p:blipFill>
+        <p:spPr bwMode="auto">
+          <a:xfrm>
+            <a:off x="4933347" y="3174811"/>
+            <a:ext cx="1854314" cy="480278"/>
+          </a:xfrm>
+          <a:prstGeom prst="rect">
+            <a:avLst/>
+          </a:prstGeom>
+          <a:noFill/>
+          <a:ln>
+            <a:noFill/>
+          </a:ln>
+          <a:extLst>
+            <a:ext uri="{909E8E84-426E-40DD-AFC4-6F175D3DCCD1}">
+              <a14:hiddenFill xmlns:a14="http://schemas.microsoft.com/office/drawing/2010/main">
+                <a:solidFill>
+                  <a:schemeClr val="accent1"/>
+                </a:solidFill>
+              </a14:hiddenFill>
+            </a:ext>
+            <a:ext uri="{91240B29-F687-4F45-9708-019B960494DF}">
+              <a14:hiddenLine xmlns:a14="http://schemas.microsoft.com/office/drawing/2010/main" w="9525">
+                <a:solidFill>
+                  <a:schemeClr val="tx1"/>
+                </a:solidFill>
+                <a:miter lim="800000"/>
+                <a:headEnd/>
+                <a:tailEnd/>
+              </a14:hiddenLine>
+            </a:ext>
+          </a:extLst>
+        </p:spPr>
+      </p:pic>
+      <p:pic>
+        <p:nvPicPr>
+          <p:cNvPr id="1029" name="Picture 5"/>
+          <p:cNvPicPr>
+            <a:picLocks noChangeAspect="1" noChangeArrowheads="1"/>
+          </p:cNvPicPr>
+          <p:nvPr/>
+        </p:nvPicPr>
+        <p:blipFill>
+          <a:blip r:embed="rId4">
+            <a:extLst>
+              <a:ext uri="{28A0092B-C50C-407E-A947-70E740481C1C}">
+                <a14:useLocalDpi xmlns:a14="http://schemas.microsoft.com/office/drawing/2010/main" val="0"/>
+              </a:ext>
+            </a:extLst>
+          </a:blip>
+          <a:srcRect/>
+          <a:stretch>
+            <a:fillRect/>
+          </a:stretch>
+        </p:blipFill>
+        <p:spPr bwMode="auto">
+          <a:xfrm>
+            <a:off x="4408706" y="4237840"/>
+            <a:ext cx="2903596" cy="555233"/>
+          </a:xfrm>
+          <a:prstGeom prst="rect">
+            <a:avLst/>
+          </a:prstGeom>
+          <a:noFill/>
+          <a:ln>
+            <a:noFill/>
+          </a:ln>
+          <a:extLst>
+            <a:ext uri="{909E8E84-426E-40DD-AFC4-6F175D3DCCD1}">
+              <a14:hiddenFill xmlns:a14="http://schemas.microsoft.com/office/drawing/2010/main">
+                <a:solidFill>
+                  <a:schemeClr val="accent1"/>
+                </a:solidFill>
+              </a14:hiddenFill>
+            </a:ext>
+            <a:ext uri="{91240B29-F687-4F45-9708-019B960494DF}">
+              <a14:hiddenLine xmlns:a14="http://schemas.microsoft.com/office/drawing/2010/main" w="9525">
+                <a:solidFill>
+                  <a:schemeClr val="tx1"/>
+                </a:solidFill>
+                <a:miter lim="800000"/>
+                <a:headEnd/>
+                <a:tailEnd/>
+              </a14:hiddenLine>
+            </a:ext>
+          </a:extLst>
+        </p:spPr>
+      </p:pic>
     </p:spTree>
     <p:extLst>
       <p:ext uri="{BB962C8B-B14F-4D97-AF65-F5344CB8AC3E}">
-        <p14:creationId xmlns:p14="http://schemas.microsoft.com/office/powerpoint/2010/main" val="3689221183"/>
+        <p14:creationId xmlns:p14="http://schemas.microsoft.com/office/powerpoint/2010/main" val="2498370072"/>
+      </p:ext>
+    </p:extLst>
+  </p:cSld>
+  <p:clrMapOvr>
+    <a:masterClrMapping/>
+  </p:clrMapOvr>
+</p:sld>
+</file>
+
+<file path=ppt/slides/slide14.xml><?xml version="1.0" encoding="utf-8"?>
+<p:sld xmlns:a="http://schemas.openxmlformats.org/drawingml/2006/main" xmlns:r="http://schemas.openxmlformats.org/officeDocument/2006/relationships" xmlns:p="http://schemas.openxmlformats.org/presentationml/2006/main">
+  <p:cSld>
+    <p:spTree>
+      <p:nvGrpSpPr>
+        <p:cNvPr id="1" name=""/>
+        <p:cNvGrpSpPr/>
+        <p:nvPr/>
+      </p:nvGrpSpPr>
+      <p:grpSpPr>
+        <a:xfrm>
+          <a:off x="0" y="0"/>
+          <a:ext cx="0" cy="0"/>
+          <a:chOff x="0" y="0"/>
+          <a:chExt cx="0" cy="0"/>
+        </a:xfrm>
+      </p:grpSpPr>
+      <p:sp>
+        <p:nvSpPr>
+          <p:cNvPr id="4" name="Title 3"/>
+          <p:cNvSpPr>
+            <a:spLocks noGrp="1"/>
+          </p:cNvSpPr>
+          <p:nvPr>
+            <p:ph type="title"/>
+          </p:nvPr>
+        </p:nvSpPr>
+        <p:spPr>
+          <a:xfrm>
+            <a:off x="2837853" y="640439"/>
+            <a:ext cx="7873691" cy="1057732"/>
+          </a:xfrm>
+        </p:spPr>
+        <p:txBody>
+          <a:bodyPr/>
+          <a:lstStyle/>
+          <a:p>
+            <a:r>
+              <a:rPr lang="en-US" dirty="0" smtClean="0"/>
+              <a:t>Needleman-</a:t>
+            </a:r>
+            <a:r>
+              <a:rPr lang="en-US" dirty="0" err="1" smtClean="0"/>
+              <a:t>Wunsch</a:t>
+            </a:r>
+            <a:r>
+              <a:rPr lang="en-US" dirty="0" smtClean="0"/>
+              <a:t> Algorithm</a:t>
+            </a:r>
+            <a:endParaRPr lang="en-US" dirty="0"/>
+          </a:p>
+        </p:txBody>
+      </p:sp>
+      <p:sp>
+        <p:nvSpPr>
+          <p:cNvPr id="5" name="Content Placeholder 4"/>
+          <p:cNvSpPr>
+            <a:spLocks noGrp="1"/>
+          </p:cNvSpPr>
+          <p:nvPr>
+            <p:ph sz="half" idx="1"/>
+          </p:nvPr>
+        </p:nvSpPr>
+        <p:spPr/>
+        <p:txBody>
+          <a:bodyPr/>
+          <a:lstStyle/>
+          <a:p>
+            <a:r>
+              <a:rPr lang="en-US" dirty="0"/>
+              <a:t>Using Emily Dickinson Poem</a:t>
+            </a:r>
+          </a:p>
+          <a:p>
+            <a:endParaRPr lang="en-US" dirty="0"/>
+          </a:p>
+        </p:txBody>
+      </p:sp>
+      <p:sp>
+        <p:nvSpPr>
+          <p:cNvPr id="6" name="Content Placeholder 5"/>
+          <p:cNvSpPr>
+            <a:spLocks noGrp="1"/>
+          </p:cNvSpPr>
+          <p:nvPr>
+            <p:ph sz="half" idx="2"/>
+          </p:nvPr>
+        </p:nvSpPr>
+        <p:spPr/>
+        <p:txBody>
+          <a:bodyPr/>
+          <a:lstStyle/>
+          <a:p>
+            <a:r>
+              <a:rPr lang="en-US" dirty="0"/>
+              <a:t>Using </a:t>
+            </a:r>
+            <a:r>
+              <a:rPr lang="en-US" dirty="0" err="1" smtClean="0"/>
+              <a:t>Gregs</a:t>
+            </a:r>
+            <a:r>
+              <a:rPr lang="en-US" dirty="0" smtClean="0"/>
+              <a:t> </a:t>
+            </a:r>
+            <a:r>
+              <a:rPr lang="en-US" dirty="0"/>
+              <a:t>Input</a:t>
+            </a:r>
+          </a:p>
+          <a:p>
+            <a:endParaRPr lang="en-US" dirty="0"/>
+          </a:p>
+        </p:txBody>
+      </p:sp>
+      <p:graphicFrame>
+        <p:nvGraphicFramePr>
+          <p:cNvPr id="7" name="Chart 6"/>
+          <p:cNvGraphicFramePr>
+            <a:graphicFrameLocks/>
+          </p:cNvGraphicFramePr>
+          <p:nvPr>
+            <p:extLst>
+              <p:ext uri="{D42A27DB-BD31-4B8C-83A1-F6EECF244321}">
+                <p14:modId xmlns:p14="http://schemas.microsoft.com/office/powerpoint/2010/main" val="749596821"/>
+              </p:ext>
+            </p:extLst>
+          </p:nvPr>
+        </p:nvGraphicFramePr>
+        <p:xfrm>
+          <a:off x="6531429" y="2530928"/>
+          <a:ext cx="4272641" cy="1730828"/>
+        </p:xfrm>
+        <a:graphic>
+          <a:graphicData uri="http://schemas.openxmlformats.org/drawingml/2006/chart">
+            <c:chart xmlns:c="http://schemas.openxmlformats.org/drawingml/2006/chart" xmlns:r="http://schemas.openxmlformats.org/officeDocument/2006/relationships" r:id="rId2"/>
+          </a:graphicData>
+        </a:graphic>
+      </p:graphicFrame>
+      <p:graphicFrame>
+        <p:nvGraphicFramePr>
+          <p:cNvPr id="8" name="Chart 7"/>
+          <p:cNvGraphicFramePr>
+            <a:graphicFrameLocks/>
+          </p:cNvGraphicFramePr>
+          <p:nvPr>
+            <p:extLst>
+              <p:ext uri="{D42A27DB-BD31-4B8C-83A1-F6EECF244321}">
+                <p14:modId xmlns:p14="http://schemas.microsoft.com/office/powerpoint/2010/main" val="3399821312"/>
+              </p:ext>
+            </p:extLst>
+          </p:nvPr>
+        </p:nvGraphicFramePr>
+        <p:xfrm>
+          <a:off x="6531429" y="4245429"/>
+          <a:ext cx="4272644" cy="1657350"/>
+        </p:xfrm>
+        <a:graphic>
+          <a:graphicData uri="http://schemas.openxmlformats.org/drawingml/2006/chart">
+            <c:chart xmlns:c="http://schemas.openxmlformats.org/drawingml/2006/chart" xmlns:r="http://schemas.openxmlformats.org/officeDocument/2006/relationships" r:id="rId3"/>
+          </a:graphicData>
+        </a:graphic>
+      </p:graphicFrame>
+      <p:graphicFrame>
+        <p:nvGraphicFramePr>
+          <p:cNvPr id="9" name="Chart 8"/>
+          <p:cNvGraphicFramePr>
+            <a:graphicFrameLocks/>
+          </p:cNvGraphicFramePr>
+          <p:nvPr>
+            <p:extLst>
+              <p:ext uri="{D42A27DB-BD31-4B8C-83A1-F6EECF244321}">
+                <p14:modId xmlns:p14="http://schemas.microsoft.com/office/powerpoint/2010/main" val="603051052"/>
+              </p:ext>
+            </p:extLst>
+          </p:nvPr>
+        </p:nvGraphicFramePr>
+        <p:xfrm>
+          <a:off x="2090058" y="2537051"/>
+          <a:ext cx="4376056" cy="3341236"/>
+        </p:xfrm>
+        <a:graphic>
+          <a:graphicData uri="http://schemas.openxmlformats.org/drawingml/2006/chart">
+            <c:chart xmlns:c="http://schemas.openxmlformats.org/drawingml/2006/chart" xmlns:r="http://schemas.openxmlformats.org/officeDocument/2006/relationships" r:id="rId4"/>
+          </a:graphicData>
+        </a:graphic>
+      </p:graphicFrame>
+    </p:spTree>
+    <p:extLst>
+      <p:ext uri="{BB962C8B-B14F-4D97-AF65-F5344CB8AC3E}">
+        <p14:creationId xmlns:p14="http://schemas.microsoft.com/office/powerpoint/2010/main" val="1911095607"/>
+      </p:ext>
+    </p:extLst>
+  </p:cSld>
+  <p:clrMapOvr>
+    <a:masterClrMapping/>
+  </p:clrMapOvr>
+</p:sld>
+</file>
+
+<file path=ppt/slides/slide15.xml><?xml version="1.0" encoding="utf-8"?>
+<p:sld xmlns:a="http://schemas.openxmlformats.org/drawingml/2006/main" xmlns:r="http://schemas.openxmlformats.org/officeDocument/2006/relationships" xmlns:p="http://schemas.openxmlformats.org/presentationml/2006/main">
+  <p:cSld>
+    <p:spTree>
+      <p:nvGrpSpPr>
+        <p:cNvPr id="1" name=""/>
+        <p:cNvGrpSpPr/>
+        <p:nvPr/>
+      </p:nvGrpSpPr>
+      <p:grpSpPr>
+        <a:xfrm>
+          <a:off x="0" y="0"/>
+          <a:ext cx="0" cy="0"/>
+          <a:chOff x="0" y="0"/>
+          <a:chExt cx="0" cy="0"/>
+        </a:xfrm>
+      </p:grpSpPr>
+      <p:sp>
+        <p:nvSpPr>
+          <p:cNvPr id="2" name="Title 1"/>
+          <p:cNvSpPr>
+            <a:spLocks noGrp="1"/>
+          </p:cNvSpPr>
+          <p:nvPr>
+            <p:ph type="title"/>
+          </p:nvPr>
+        </p:nvSpPr>
+        <p:spPr>
+          <a:xfrm>
+            <a:off x="2106387" y="624110"/>
+            <a:ext cx="9372599" cy="1280890"/>
+          </a:xfrm>
+        </p:spPr>
+        <p:txBody>
+          <a:bodyPr/>
+          <a:lstStyle/>
+          <a:p>
+            <a:r>
+              <a:rPr lang="en-US" dirty="0" smtClean="0"/>
+              <a:t>Time Complexity for </a:t>
+            </a:r>
+            <a:r>
+              <a:rPr lang="en-US" dirty="0" smtClean="0"/>
+              <a:t>Needleman-Wunsch </a:t>
+            </a:r>
+            <a:endParaRPr lang="en-US" dirty="0"/>
+          </a:p>
+        </p:txBody>
+      </p:sp>
+      <p:sp>
+        <p:nvSpPr>
+          <p:cNvPr id="4" name="TextBox 3"/>
+          <p:cNvSpPr txBox="1"/>
+          <p:nvPr/>
+        </p:nvSpPr>
+        <p:spPr>
+          <a:xfrm>
+            <a:off x="4546601" y="5964584"/>
+            <a:ext cx="3937000" cy="369332"/>
+          </a:xfrm>
+          <a:prstGeom prst="rect">
+            <a:avLst/>
+          </a:prstGeom>
+          <a:noFill/>
+        </p:spPr>
+        <p:txBody>
+          <a:bodyPr wrap="square" rtlCol="0">
+            <a:spAutoFit/>
+          </a:bodyPr>
+          <a:lstStyle/>
+          <a:p>
+            <a:r>
+              <a:rPr lang="en-US" dirty="0" smtClean="0"/>
+              <a:t>Using the Emily Dickinson Poem</a:t>
+            </a:r>
+            <a:endParaRPr lang="en-US" dirty="0"/>
+          </a:p>
+        </p:txBody>
+      </p:sp>
+      <p:graphicFrame>
+        <p:nvGraphicFramePr>
+          <p:cNvPr id="5" name="Chart 4"/>
+          <p:cNvGraphicFramePr>
+            <a:graphicFrameLocks/>
+          </p:cNvGraphicFramePr>
+          <p:nvPr>
+            <p:extLst>
+              <p:ext uri="{D42A27DB-BD31-4B8C-83A1-F6EECF244321}">
+                <p14:modId xmlns:p14="http://schemas.microsoft.com/office/powerpoint/2010/main" val="3089838952"/>
+              </p:ext>
+            </p:extLst>
+          </p:nvPr>
+        </p:nvGraphicFramePr>
+        <p:xfrm>
+          <a:off x="2530929" y="1306285"/>
+          <a:ext cx="8180614" cy="4430483"/>
+        </p:xfrm>
+        <a:graphic>
+          <a:graphicData uri="http://schemas.openxmlformats.org/drawingml/2006/chart">
+            <c:chart xmlns:c="http://schemas.openxmlformats.org/drawingml/2006/chart" xmlns:r="http://schemas.openxmlformats.org/officeDocument/2006/relationships" r:id="rId2"/>
+          </a:graphicData>
+        </a:graphic>
+      </p:graphicFrame>
+    </p:spTree>
+    <p:extLst>
+      <p:ext uri="{BB962C8B-B14F-4D97-AF65-F5344CB8AC3E}">
+        <p14:creationId xmlns:p14="http://schemas.microsoft.com/office/powerpoint/2010/main" val="1697689276"/>
       </p:ext>
     </p:extLst>
   </p:cSld>
@@ -14322,11 +16709,7 @@
           <a:p>
             <a:r>
               <a:rPr lang="en-US" dirty="0" smtClean="0"/>
-              <a:t>Jaro-Winkler </a:t>
-            </a:r>
-            <a:r>
-              <a:rPr lang="en-US" dirty="0" smtClean="0"/>
-              <a:t>Algorithm</a:t>
+              <a:t>Jaro-Winkler Algorithm</a:t>
             </a:r>
             <a:endParaRPr lang="en-US" dirty="0"/>
           </a:p>
@@ -14366,7 +16749,6 @@
               <a:rPr lang="en-US" dirty="0" smtClean="0"/>
               <a:t> Technologies, Inc.</a:t>
             </a:r>
-            <a:endParaRPr lang="en-US" dirty="0" smtClean="0"/>
           </a:p>
           <a:p>
             <a:pPr lvl="1"/>
@@ -14374,7 +16756,6 @@
               <a:rPr lang="en-US" dirty="0" smtClean="0"/>
               <a:t>Bill Winkler – U.S. Bureau of the Census</a:t>
             </a:r>
-            <a:endParaRPr lang="en-US" dirty="0" smtClean="0"/>
           </a:p>
           <a:p>
             <a:r>
@@ -14465,15 +16846,7 @@
           <a:p>
             <a:r>
               <a:rPr lang="en-US" dirty="0" smtClean="0"/>
-              <a:t>How </a:t>
-            </a:r>
-            <a:r>
-              <a:rPr lang="en-US" dirty="0" smtClean="0"/>
-              <a:t>Jaro-Winkler </a:t>
-            </a:r>
-            <a:r>
-              <a:rPr lang="en-US" dirty="0" smtClean="0"/>
-              <a:t>works</a:t>
+              <a:t>How Jaro-Winkler works</a:t>
             </a:r>
             <a:endParaRPr lang="en-US" dirty="0"/>
           </a:p>
@@ -14503,15 +16876,7 @@
           <a:p>
             <a:r>
               <a:rPr lang="en-US" dirty="0" smtClean="0"/>
-              <a:t>Jaro-Winkler </a:t>
-            </a:r>
-            <a:r>
-              <a:rPr lang="en-US" dirty="0" smtClean="0"/>
-              <a:t>requires </a:t>
-            </a:r>
-            <a:r>
-              <a:rPr lang="en-US" dirty="0" smtClean="0"/>
-              <a:t>two parts </a:t>
+              <a:t>Jaro-Winkler requires two parts </a:t>
             </a:r>
             <a:endParaRPr lang="en-US" dirty="0" smtClean="0">
               <a:solidFill>
@@ -15005,11 +17370,7 @@
           <a:p>
             <a:r>
               <a:rPr lang="en-US" dirty="0" smtClean="0"/>
-              <a:t>Time Complexity for </a:t>
-            </a:r>
-            <a:r>
-              <a:rPr lang="en-US" dirty="0" smtClean="0"/>
-              <a:t>Jaro-Winkler </a:t>
+              <a:t>Time Complexity for Jaro-Winkler </a:t>
             </a:r>
             <a:endParaRPr lang="en-US" dirty="0"/>
           </a:p>
@@ -16403,7 +18764,7 @@
   <a:extraClrSchemeLst/>
   <a:extLst>
     <a:ext uri="{05A4C25C-085E-4340-85A3-A5531E510DB2}">
-      <thm15:themeFamily xmlns:thm15="http://schemas.microsoft.com/office/thememl/2012/main" xmlns="" name="Wisp" id="{7CB32D59-10C0-40DD-B7BD-2E94284A981C}" vid="{24B1A44C-C006-48B2-A4D7-E5549B3D8CD4}"/>
+      <thm15:themeFamily xmlns="" xmlns:thm15="http://schemas.microsoft.com/office/thememl/2012/main" name="Wisp" id="{7CB32D59-10C0-40DD-B7BD-2E94284A981C}" vid="{24B1A44C-C006-48B2-A4D7-E5549B3D8CD4}"/>
     </a:ext>
   </a:extLst>
 </a:theme>

</xml_diff>

<commit_message>
Final touches for turn-in ppt and paper
Final touches for turn-in ppt and paper
</commit_message>
<xml_diff>
--- a/PowerPoint/Digital Humanities.pptx
+++ b/PowerPoint/Digital Humanities.pptx
@@ -120,7 +120,7 @@
   </p:defaultTextStyle>
   <p:extLst>
     <p:ext uri="{EFAFB233-063F-42B5-8137-9DF3F51BA10A}">
-      <p15:sldGuideLst xmlns:p15="http://schemas.microsoft.com/office/powerpoint/2012/main" xmlns="">
+      <p15:sldGuideLst xmlns="" xmlns:p15="http://schemas.microsoft.com/office/powerpoint/2012/main">
         <p15:guide id="1" orient="horz" pos="2160">
           <p15:clr>
             <a:srgbClr val="A4A3A4"/>
@@ -404,11 +404,11 @@
         </c:dLbls>
         <c:gapWidth val="100"/>
         <c:overlap val="-24"/>
-        <c:axId val="131210752"/>
-        <c:axId val="165795456"/>
+        <c:axId val="110398976"/>
+        <c:axId val="75847296"/>
       </c:barChart>
       <c:catAx>
-        <c:axId val="131210752"/>
+        <c:axId val="110398976"/>
         <c:scaling>
           <c:orientation val="minMax"/>
         </c:scaling>
@@ -450,7 +450,7 @@
             <a:endParaRPr lang="en-US"/>
           </a:p>
         </c:txPr>
-        <c:crossAx val="165795456"/>
+        <c:crossAx val="75847296"/>
         <c:crosses val="autoZero"/>
         <c:auto val="1"/>
         <c:lblAlgn val="ctr"/>
@@ -458,7 +458,7 @@
         <c:noMultiLvlLbl val="0"/>
       </c:catAx>
       <c:valAx>
-        <c:axId val="165795456"/>
+        <c:axId val="75847296"/>
         <c:scaling>
           <c:orientation val="minMax"/>
         </c:scaling>
@@ -508,7 +508,7 @@
             <a:endParaRPr lang="en-US"/>
           </a:p>
         </c:txPr>
-        <c:crossAx val="131210752"/>
+        <c:crossAx val="110398976"/>
         <c:crosses val="autoZero"/>
         <c:crossBetween val="between"/>
       </c:valAx>
@@ -822,11 +822,11 @@
           <c:showBubbleSize val="0"/>
         </c:dLbls>
         <c:gapWidth val="150"/>
-        <c:axId val="132498944"/>
-        <c:axId val="132413056"/>
+        <c:axId val="37591552"/>
+        <c:axId val="37828224"/>
       </c:barChart>
       <c:catAx>
-        <c:axId val="132498944"/>
+        <c:axId val="37591552"/>
         <c:scaling>
           <c:orientation val="minMax"/>
         </c:scaling>
@@ -868,7 +868,7 @@
             <a:endParaRPr lang="en-US"/>
           </a:p>
         </c:txPr>
-        <c:crossAx val="132413056"/>
+        <c:crossAx val="37828224"/>
         <c:crosses val="autoZero"/>
         <c:auto val="1"/>
         <c:lblAlgn val="ctr"/>
@@ -876,7 +876,7 @@
         <c:noMultiLvlLbl val="0"/>
       </c:catAx>
       <c:valAx>
-        <c:axId val="132413056"/>
+        <c:axId val="37828224"/>
         <c:scaling>
           <c:orientation val="minMax"/>
         </c:scaling>
@@ -926,7 +926,7 @@
             <a:endParaRPr lang="en-US"/>
           </a:p>
         </c:txPr>
-        <c:crossAx val="132498944"/>
+        <c:crossAx val="37591552"/>
         <c:crosses val="autoZero"/>
         <c:crossBetween val="between"/>
       </c:valAx>
@@ -1272,11 +1272,11 @@
           <c:showBubbleSize val="0"/>
         </c:dLbls>
         <c:gapWidth val="150"/>
-        <c:axId val="132499456"/>
-        <c:axId val="132414784"/>
+        <c:axId val="37592064"/>
+        <c:axId val="37829952"/>
       </c:barChart>
       <c:catAx>
-        <c:axId val="132499456"/>
+        <c:axId val="37592064"/>
         <c:scaling>
           <c:orientation val="minMax"/>
         </c:scaling>
@@ -1318,7 +1318,7 @@
             <a:endParaRPr lang="en-US"/>
           </a:p>
         </c:txPr>
-        <c:crossAx val="132414784"/>
+        <c:crossAx val="37829952"/>
         <c:crosses val="autoZero"/>
         <c:auto val="1"/>
         <c:lblAlgn val="ctr"/>
@@ -1326,7 +1326,7 @@
         <c:noMultiLvlLbl val="0"/>
       </c:catAx>
       <c:valAx>
-        <c:axId val="132414784"/>
+        <c:axId val="37829952"/>
         <c:scaling>
           <c:orientation val="minMax"/>
         </c:scaling>
@@ -1376,7 +1376,7 @@
             <a:endParaRPr lang="en-US"/>
           </a:p>
         </c:txPr>
-        <c:crossAx val="132499456"/>
+        <c:crossAx val="37592064"/>
         <c:crosses val="autoZero"/>
         <c:crossBetween val="between"/>
       </c:valAx>
@@ -1731,11 +1731,11 @@
           <c:showBubbleSize val="0"/>
         </c:dLbls>
         <c:gapWidth val="150"/>
-        <c:axId val="132499968"/>
-        <c:axId val="132924544"/>
+        <c:axId val="37592576"/>
+        <c:axId val="38405248"/>
       </c:barChart>
       <c:catAx>
-        <c:axId val="132499968"/>
+        <c:axId val="37592576"/>
         <c:scaling>
           <c:orientation val="minMax"/>
         </c:scaling>
@@ -1777,7 +1777,7 @@
             <a:endParaRPr lang="en-US"/>
           </a:p>
         </c:txPr>
-        <c:crossAx val="132924544"/>
+        <c:crossAx val="38405248"/>
         <c:crosses val="autoZero"/>
         <c:auto val="1"/>
         <c:lblAlgn val="ctr"/>
@@ -1785,7 +1785,7 @@
         <c:noMultiLvlLbl val="0"/>
       </c:catAx>
       <c:valAx>
-        <c:axId val="132924544"/>
+        <c:axId val="38405248"/>
         <c:scaling>
           <c:orientation val="minMax"/>
         </c:scaling>
@@ -1835,7 +1835,7 @@
             <a:endParaRPr lang="en-US"/>
           </a:p>
         </c:txPr>
-        <c:crossAx val="132499968"/>
+        <c:crossAx val="37592576"/>
         <c:crosses val="autoZero"/>
         <c:crossBetween val="between"/>
       </c:valAx>
@@ -2079,11 +2079,11 @@
           <c:showBubbleSize val="0"/>
         </c:dLbls>
         <c:gapWidth val="150"/>
-        <c:axId val="133015040"/>
-        <c:axId val="132925696"/>
+        <c:axId val="38008320"/>
+        <c:axId val="38406400"/>
       </c:barChart>
       <c:catAx>
-        <c:axId val="133015040"/>
+        <c:axId val="38008320"/>
         <c:scaling>
           <c:orientation val="minMax"/>
         </c:scaling>
@@ -2126,7 +2126,7 @@
             <a:endParaRPr lang="en-US"/>
           </a:p>
         </c:txPr>
-        <c:crossAx val="132925696"/>
+        <c:crossAx val="38406400"/>
         <c:crosses val="autoZero"/>
         <c:auto val="1"/>
         <c:lblAlgn val="ctr"/>
@@ -2134,7 +2134,7 @@
         <c:noMultiLvlLbl val="0"/>
       </c:catAx>
       <c:valAx>
-        <c:axId val="132925696"/>
+        <c:axId val="38406400"/>
         <c:scaling>
           <c:orientation val="minMax"/>
         </c:scaling>
@@ -2221,7 +2221,7 @@
             <a:endParaRPr lang="en-US"/>
           </a:p>
         </c:txPr>
-        <c:crossAx val="133015040"/>
+        <c:crossAx val="38008320"/>
         <c:crosses val="autoZero"/>
         <c:crossBetween val="between"/>
       </c:valAx>
@@ -2514,11 +2514,11 @@
         </c:dLbls>
         <c:gapWidth val="100"/>
         <c:overlap val="-24"/>
-        <c:axId val="131244032"/>
-        <c:axId val="165797184"/>
+        <c:axId val="111116288"/>
+        <c:axId val="75849024"/>
       </c:barChart>
       <c:catAx>
-        <c:axId val="131244032"/>
+        <c:axId val="111116288"/>
         <c:scaling>
           <c:orientation val="minMax"/>
         </c:scaling>
@@ -2560,7 +2560,7 @@
             <a:endParaRPr lang="en-US"/>
           </a:p>
         </c:txPr>
-        <c:crossAx val="165797184"/>
+        <c:crossAx val="75849024"/>
         <c:crosses val="autoZero"/>
         <c:auto val="1"/>
         <c:lblAlgn val="ctr"/>
@@ -2568,7 +2568,7 @@
         <c:noMultiLvlLbl val="0"/>
       </c:catAx>
       <c:valAx>
-        <c:axId val="165797184"/>
+        <c:axId val="75849024"/>
         <c:scaling>
           <c:orientation val="minMax"/>
         </c:scaling>
@@ -2618,7 +2618,7 @@
             <a:endParaRPr lang="en-US"/>
           </a:p>
         </c:txPr>
-        <c:crossAx val="131244032"/>
+        <c:crossAx val="111116288"/>
         <c:crosses val="autoZero"/>
         <c:crossBetween val="between"/>
       </c:valAx>
@@ -2914,11 +2914,11 @@
         </c:dLbls>
         <c:gapWidth val="75"/>
         <c:overlap val="-25"/>
-        <c:axId val="131244544"/>
-        <c:axId val="132285568"/>
+        <c:axId val="111116800"/>
+        <c:axId val="37192832"/>
       </c:barChart>
       <c:catAx>
-        <c:axId val="131244544"/>
+        <c:axId val="111116800"/>
         <c:scaling>
           <c:orientation val="minMax"/>
         </c:scaling>
@@ -2960,7 +2960,7 @@
             <a:endParaRPr lang="en-US"/>
           </a:p>
         </c:txPr>
-        <c:crossAx val="132285568"/>
+        <c:crossAx val="37192832"/>
         <c:crosses val="autoZero"/>
         <c:auto val="1"/>
         <c:lblAlgn val="ctr"/>
@@ -2968,7 +2968,7 @@
         <c:noMultiLvlLbl val="0"/>
       </c:catAx>
       <c:valAx>
-        <c:axId val="132285568"/>
+        <c:axId val="37192832"/>
         <c:scaling>
           <c:orientation val="minMax"/>
         </c:scaling>
@@ -3018,7 +3018,7 @@
             <a:endParaRPr lang="en-US"/>
           </a:p>
         </c:txPr>
-        <c:crossAx val="131244544"/>
+        <c:crossAx val="111116800"/>
         <c:crosses val="autoZero"/>
         <c:crossBetween val="between"/>
       </c:valAx>
@@ -3300,11 +3300,11 @@
           <c:showBubbleSize val="0"/>
         </c:dLbls>
         <c:gapWidth val="150"/>
-        <c:axId val="131247616"/>
-        <c:axId val="132287296"/>
+        <c:axId val="37588992"/>
+        <c:axId val="37194560"/>
       </c:barChart>
       <c:catAx>
-        <c:axId val="131247616"/>
+        <c:axId val="37588992"/>
         <c:scaling>
           <c:orientation val="minMax"/>
         </c:scaling>
@@ -3347,7 +3347,7 @@
             <a:endParaRPr lang="en-US"/>
           </a:p>
         </c:txPr>
-        <c:crossAx val="132287296"/>
+        <c:crossAx val="37194560"/>
         <c:crosses val="autoZero"/>
         <c:auto val="1"/>
         <c:lblAlgn val="ctr"/>
@@ -3355,7 +3355,7 @@
         <c:noMultiLvlLbl val="0"/>
       </c:catAx>
       <c:valAx>
-        <c:axId val="132287296"/>
+        <c:axId val="37194560"/>
         <c:scaling>
           <c:orientation val="minMax"/>
         </c:scaling>
@@ -3442,7 +3442,7 @@
             <a:endParaRPr lang="en-US"/>
           </a:p>
         </c:txPr>
-        <c:crossAx val="131247616"/>
+        <c:crossAx val="37588992"/>
         <c:crosses val="autoZero"/>
         <c:crossBetween val="between"/>
       </c:valAx>
@@ -3667,11 +3667,11 @@
           <c:showBubbleSize val="0"/>
         </c:dLbls>
         <c:gapWidth val="150"/>
-        <c:axId val="132103680"/>
-        <c:axId val="132289024"/>
+        <c:axId val="37356544"/>
+        <c:axId val="37196288"/>
       </c:barChart>
       <c:catAx>
-        <c:axId val="132103680"/>
+        <c:axId val="37356544"/>
         <c:scaling>
           <c:orientation val="minMax"/>
         </c:scaling>
@@ -3714,7 +3714,7 @@
             <a:endParaRPr lang="en-US"/>
           </a:p>
         </c:txPr>
-        <c:crossAx val="132289024"/>
+        <c:crossAx val="37196288"/>
         <c:crosses val="autoZero"/>
         <c:auto val="1"/>
         <c:lblAlgn val="ctr"/>
@@ -3722,7 +3722,7 @@
         <c:noMultiLvlLbl val="0"/>
       </c:catAx>
       <c:valAx>
-        <c:axId val="132289024"/>
+        <c:axId val="37196288"/>
         <c:scaling>
           <c:orientation val="minMax"/>
         </c:scaling>
@@ -3809,7 +3809,7 @@
             <a:endParaRPr lang="en-US"/>
           </a:p>
         </c:txPr>
-        <c:crossAx val="132103680"/>
+        <c:crossAx val="37356544"/>
         <c:crosses val="autoZero"/>
         <c:crossBetween val="between"/>
       </c:valAx>
@@ -4162,11 +4162,11 @@
         </c:dLbls>
         <c:gapWidth val="100"/>
         <c:overlap val="-24"/>
-        <c:axId val="132100096"/>
-        <c:axId val="132291904"/>
+        <c:axId val="37358080"/>
+        <c:axId val="37199168"/>
       </c:barChart>
       <c:catAx>
-        <c:axId val="132100096"/>
+        <c:axId val="37358080"/>
         <c:scaling>
           <c:orientation val="minMax"/>
         </c:scaling>
@@ -4208,7 +4208,7 @@
             <a:endParaRPr lang="en-US"/>
           </a:p>
         </c:txPr>
-        <c:crossAx val="132291904"/>
+        <c:crossAx val="37199168"/>
         <c:crosses val="autoZero"/>
         <c:auto val="1"/>
         <c:lblAlgn val="ctr"/>
@@ -4216,7 +4216,7 @@
         <c:noMultiLvlLbl val="0"/>
       </c:catAx>
       <c:valAx>
-        <c:axId val="132291904"/>
+        <c:axId val="37199168"/>
         <c:scaling>
           <c:orientation val="minMax"/>
         </c:scaling>
@@ -4266,7 +4266,7 @@
             <a:endParaRPr lang="en-US"/>
           </a:p>
         </c:txPr>
-        <c:crossAx val="132100096"/>
+        <c:crossAx val="37358080"/>
         <c:crosses val="autoZero"/>
         <c:crossBetween val="between"/>
       </c:valAx>
@@ -4530,11 +4530,11 @@
           <c:showBubbleSize val="0"/>
         </c:dLbls>
         <c:gapWidth val="115"/>
-        <c:axId val="132100608"/>
-        <c:axId val="132408448"/>
+        <c:axId val="37358592"/>
+        <c:axId val="37823616"/>
       </c:barChart>
       <c:catAx>
-        <c:axId val="132100608"/>
+        <c:axId val="37358592"/>
         <c:scaling>
           <c:orientation val="minMax"/>
         </c:scaling>
@@ -4576,7 +4576,7 @@
             <a:endParaRPr lang="en-US"/>
           </a:p>
         </c:txPr>
-        <c:crossAx val="132408448"/>
+        <c:crossAx val="37823616"/>
         <c:crosses val="autoZero"/>
         <c:auto val="1"/>
         <c:lblAlgn val="ctr"/>
@@ -4584,7 +4584,7 @@
         <c:noMultiLvlLbl val="0"/>
       </c:catAx>
       <c:valAx>
-        <c:axId val="132408448"/>
+        <c:axId val="37823616"/>
         <c:scaling>
           <c:orientation val="minMax"/>
         </c:scaling>
@@ -4634,7 +4634,7 @@
             <a:endParaRPr lang="en-US"/>
           </a:p>
         </c:txPr>
-        <c:crossAx val="132100608"/>
+        <c:crossAx val="37358592"/>
         <c:crosses val="autoZero"/>
         <c:crossBetween val="between"/>
       </c:valAx>
@@ -4898,11 +4898,11 @@
           <c:showBubbleSize val="0"/>
         </c:dLbls>
         <c:gapWidth val="115"/>
-        <c:axId val="132101632"/>
-        <c:axId val="132410176"/>
+        <c:axId val="37359104"/>
+        <c:axId val="37825344"/>
       </c:barChart>
       <c:catAx>
-        <c:axId val="132101632"/>
+        <c:axId val="37359104"/>
         <c:scaling>
           <c:orientation val="minMax"/>
         </c:scaling>
@@ -4944,7 +4944,7 @@
             <a:endParaRPr lang="en-US"/>
           </a:p>
         </c:txPr>
-        <c:crossAx val="132410176"/>
+        <c:crossAx val="37825344"/>
         <c:crosses val="autoZero"/>
         <c:auto val="1"/>
         <c:lblAlgn val="ctr"/>
@@ -4952,7 +4952,7 @@
         <c:noMultiLvlLbl val="0"/>
       </c:catAx>
       <c:valAx>
-        <c:axId val="132410176"/>
+        <c:axId val="37825344"/>
         <c:scaling>
           <c:orientation val="minMax"/>
         </c:scaling>
@@ -5002,7 +5002,7 @@
             <a:endParaRPr lang="en-US"/>
           </a:p>
         </c:txPr>
-        <c:crossAx val="132101632"/>
+        <c:crossAx val="37359104"/>
         <c:crosses val="autoZero"/>
         <c:crossBetween val="between"/>
       </c:valAx>
@@ -5253,11 +5253,11 @@
           <c:showBubbleSize val="0"/>
         </c:dLbls>
         <c:gapWidth val="150"/>
-        <c:axId val="182059008"/>
-        <c:axId val="192414272"/>
+        <c:axId val="33485312"/>
+        <c:axId val="38409856"/>
       </c:barChart>
       <c:catAx>
-        <c:axId val="182059008"/>
+        <c:axId val="33485312"/>
         <c:scaling>
           <c:orientation val="minMax"/>
         </c:scaling>
@@ -5300,7 +5300,7 @@
             <a:endParaRPr lang="en-US"/>
           </a:p>
         </c:txPr>
-        <c:crossAx val="192414272"/>
+        <c:crossAx val="38409856"/>
         <c:crosses val="autoZero"/>
         <c:auto val="1"/>
         <c:lblAlgn val="ctr"/>
@@ -5308,7 +5308,7 @@
         <c:noMultiLvlLbl val="0"/>
       </c:catAx>
       <c:valAx>
-        <c:axId val="192414272"/>
+        <c:axId val="38409856"/>
         <c:scaling>
           <c:orientation val="minMax"/>
         </c:scaling>
@@ -5395,7 +5395,7 @@
             <a:endParaRPr lang="en-US"/>
           </a:p>
         </c:txPr>
-        <c:crossAx val="182059008"/>
+        <c:crossAx val="33485312"/>
         <c:crosses val="autoZero"/>
         <c:crossBetween val="between"/>
       </c:valAx>
@@ -15609,13 +15609,24 @@
             <a:pPr lvl="1"/>
             <a:r>
               <a:rPr lang="en-US" dirty="0" smtClean="0"/>
-              <a:t>Saul B Needleman and Christian D </a:t>
-            </a:r>
-            <a:r>
-              <a:rPr lang="en-US" dirty="0" err="1" smtClean="0"/>
+              <a:t>Saul </a:t>
+            </a:r>
+            <a:r>
+              <a:rPr lang="en-US" dirty="0" smtClean="0"/>
+              <a:t>B. </a:t>
+            </a:r>
+            <a:r>
+              <a:rPr lang="en-US" dirty="0" smtClean="0"/>
+              <a:t>Needleman and Christian </a:t>
+            </a:r>
+            <a:r>
+              <a:rPr lang="en-US" dirty="0" smtClean="0"/>
+              <a:t>D. </a:t>
+            </a:r>
+            <a:r>
+              <a:rPr lang="en-US" dirty="0" smtClean="0"/>
               <a:t>Wunsch</a:t>
             </a:r>
-            <a:endParaRPr lang="en-US" dirty="0" smtClean="0"/>
           </a:p>
           <a:p>
             <a:pPr lvl="1"/>
@@ -15745,11 +15756,7 @@
             </a:pPr>
             <a:r>
               <a:rPr lang="en-US" dirty="0" smtClean="0"/>
-              <a:t>The algorith</a:t>
-            </a:r>
-            <a:r>
-              <a:rPr lang="en-US" dirty="0" smtClean="0"/>
-              <a:t>m assigns ASCII values to each string</a:t>
+              <a:t>The algorithm assigns ASCII values to each string</a:t>
             </a:r>
           </a:p>
           <a:p>
@@ -15783,15 +15790,7 @@
             </a:pPr>
             <a:r>
               <a:rPr lang="en-US" dirty="0" smtClean="0"/>
-              <a:t>If </a:t>
-            </a:r>
-            <a:r>
-              <a:rPr lang="en-US" dirty="0" smtClean="0"/>
-              <a:t>algorithm</a:t>
-            </a:r>
-            <a:r>
-              <a:rPr lang="en-US" dirty="0" smtClean="0"/>
-              <a:t> recognizing gap in sequence – gap penalty is assigned</a:t>
+              <a:t>If algorithm recognizing gap in sequence – gap penalty is assigned</a:t>
             </a:r>
           </a:p>
           <a:p>
@@ -15956,12 +15955,8 @@
               <a:t>Using </a:t>
             </a:r>
             <a:r>
-              <a:rPr lang="en-US" dirty="0" err="1" smtClean="0"/>
-              <a:t>Gregs</a:t>
-            </a:r>
-            <a:r>
               <a:rPr lang="en-US" dirty="0" smtClean="0"/>
-              <a:t> </a:t>
+              <a:t>Greg’s </a:t>
             </a:r>
             <a:r>
               <a:rPr lang="en-US" dirty="0"/>
@@ -16758,7 +16753,15 @@
             </a:pPr>
             <a:r>
               <a:rPr lang="en-US" dirty="0" smtClean="0"/>
-              <a:t>Obtain Jaro-Winkler score by determining if arbitrary boost threshold is met and apply boost prefix if so:</a:t>
+              <a:t>Obtain Jaro-Winkler </a:t>
+            </a:r>
+            <a:r>
+              <a:rPr lang="en-US" dirty="0" smtClean="0"/>
+              <a:t> score </a:t>
+            </a:r>
+            <a:r>
+              <a:rPr lang="en-US" dirty="0" smtClean="0"/>
+              <a:t>by determining if arbitrary boost threshold is met and apply boost prefix if so:</a:t>
             </a:r>
           </a:p>
           <a:p>
@@ -18583,7 +18586,7 @@
   <a:extraClrSchemeLst/>
   <a:extLst>
     <a:ext uri="{05A4C25C-085E-4340-85A3-A5531E510DB2}">
-      <thm15:themeFamily xmlns:thm15="http://schemas.microsoft.com/office/thememl/2012/main" xmlns="" name="Wisp" id="{7CB32D59-10C0-40DD-B7BD-2E94284A981C}" vid="{24B1A44C-C006-48B2-A4D7-E5549B3D8CD4}"/>
+      <thm15:themeFamily xmlns="" xmlns:thm15="http://schemas.microsoft.com/office/thememl/2012/main" name="Wisp" id="{7CB32D59-10C0-40DD-B7BD-2E94284A981C}" vid="{24B1A44C-C006-48B2-A4D7-E5549B3D8CD4}"/>
     </a:ext>
   </a:extLst>
 </a:theme>

</xml_diff>

<commit_message>
ppt: moved ASU logo
</commit_message>
<xml_diff>
--- a/PowerPoint/Digital Humanities.pptx
+++ b/PowerPoint/Digital Humanities.pptx
@@ -118,7 +118,7 @@
   </p:defaultTextStyle>
   <p:extLst>
     <p:ext uri="{EFAFB233-063F-42B5-8137-9DF3F51BA10A}">
-      <p15:sldGuideLst xmlns:p15="http://schemas.microsoft.com/office/powerpoint/2012/main">
+      <p15:sldGuideLst xmlns:p15="http://schemas.microsoft.com/office/powerpoint/2012/main" xmlns="">
         <p15:guide id="1" orient="horz" pos="2160">
           <p15:clr>
             <a:srgbClr val="A4A3A4"/>
@@ -328,11 +328,11 @@
           <c:showBubbleSize val="0"/>
         </c:dLbls>
         <c:gapWidth val="150"/>
-        <c:axId val="249294752"/>
-        <c:axId val="250064944"/>
+        <c:axId val="48455680"/>
+        <c:axId val="40276480"/>
       </c:barChart>
       <c:catAx>
-        <c:axId val="249294752"/>
+        <c:axId val="48455680"/>
         <c:scaling>
           <c:orientation val="minMax"/>
         </c:scaling>
@@ -375,7 +375,7 @@
             <a:endParaRPr lang="en-US"/>
           </a:p>
         </c:txPr>
-        <c:crossAx val="250064944"/>
+        <c:crossAx val="40276480"/>
         <c:crosses val="autoZero"/>
         <c:auto val="1"/>
         <c:lblAlgn val="ctr"/>
@@ -383,7 +383,7 @@
         <c:noMultiLvlLbl val="0"/>
       </c:catAx>
       <c:valAx>
-        <c:axId val="250064944"/>
+        <c:axId val="40276480"/>
         <c:scaling>
           <c:orientation val="minMax"/>
         </c:scaling>
@@ -470,7 +470,7 @@
             <a:endParaRPr lang="en-US"/>
           </a:p>
         </c:txPr>
-        <c:crossAx val="249294752"/>
+        <c:crossAx val="48455680"/>
         <c:crosses val="autoZero"/>
         <c:crossBetween val="between"/>
       </c:valAx>
@@ -695,11 +695,11 @@
           <c:showBubbleSize val="0"/>
         </c:dLbls>
         <c:gapWidth val="150"/>
-        <c:axId val="250065728"/>
-        <c:axId val="250066120"/>
+        <c:axId val="48459264"/>
+        <c:axId val="40278208"/>
       </c:barChart>
       <c:catAx>
-        <c:axId val="250065728"/>
+        <c:axId val="48459264"/>
         <c:scaling>
           <c:orientation val="minMax"/>
         </c:scaling>
@@ -742,7 +742,7 @@
             <a:endParaRPr lang="en-US"/>
           </a:p>
         </c:txPr>
-        <c:crossAx val="250066120"/>
+        <c:crossAx val="40278208"/>
         <c:crosses val="autoZero"/>
         <c:auto val="1"/>
         <c:lblAlgn val="ctr"/>
@@ -750,7 +750,7 @@
         <c:noMultiLvlLbl val="0"/>
       </c:catAx>
       <c:valAx>
-        <c:axId val="250066120"/>
+        <c:axId val="40278208"/>
         <c:scaling>
           <c:orientation val="minMax"/>
         </c:scaling>
@@ -837,7 +837,7 @@
             <a:endParaRPr lang="en-US"/>
           </a:p>
         </c:txPr>
-        <c:crossAx val="250065728"/>
+        <c:crossAx val="48459264"/>
         <c:crosses val="autoZero"/>
         <c:crossBetween val="between"/>
       </c:valAx>
@@ -979,26 +979,6 @@
         </a:ln>
         <a:effectLst/>
       </c:spPr>
-      <c:txPr>
-        <a:bodyPr rot="0" spcFirstLastPara="1" vertOverflow="ellipsis" vert="horz" wrap="square" anchor="ctr" anchorCtr="1"/>
-        <a:lstStyle/>
-        <a:p>
-          <a:pPr>
-            <a:defRPr sz="1400" b="0" i="0" u="none" strike="noStrike" kern="1200" spc="0" baseline="0">
-              <a:solidFill>
-                <a:schemeClr val="tx1">
-                  <a:lumMod val="65000"/>
-                  <a:lumOff val="35000"/>
-                </a:schemeClr>
-              </a:solidFill>
-              <a:latin typeface="+mn-lt"/>
-              <a:ea typeface="+mn-ea"/>
-              <a:cs typeface="+mn-cs"/>
-            </a:defRPr>
-          </a:pPr>
-          <a:endParaRPr lang="en-US"/>
-        </a:p>
-      </c:txPr>
     </c:title>
     <c:autoTitleDeleted val="0"/>
     <c:plotArea>
@@ -1136,11 +1116,11 @@
           <c:showBubbleSize val="0"/>
         </c:dLbls>
         <c:gapWidth val="150"/>
-        <c:axId val="251081272"/>
-        <c:axId val="344988016"/>
+        <c:axId val="39249408"/>
+        <c:axId val="140304960"/>
       </c:barChart>
       <c:catAx>
-        <c:axId val="251081272"/>
+        <c:axId val="39249408"/>
         <c:scaling>
           <c:orientation val="minMax"/>
         </c:scaling>
@@ -1183,7 +1163,7 @@
             <a:endParaRPr lang="en-US"/>
           </a:p>
         </c:txPr>
-        <c:crossAx val="344988016"/>
+        <c:crossAx val="140304960"/>
         <c:crosses val="autoZero"/>
         <c:auto val="1"/>
         <c:lblAlgn val="ctr"/>
@@ -1191,7 +1171,7 @@
         <c:noMultiLvlLbl val="0"/>
       </c:catAx>
       <c:valAx>
-        <c:axId val="344988016"/>
+        <c:axId val="140304960"/>
         <c:scaling>
           <c:orientation val="minMax"/>
         </c:scaling>
@@ -1246,26 +1226,6 @@
             </a:ln>
             <a:effectLst/>
           </c:spPr>
-          <c:txPr>
-            <a:bodyPr rot="-5400000" spcFirstLastPara="1" vertOverflow="ellipsis" vert="horz" wrap="square" anchor="ctr" anchorCtr="1"/>
-            <a:lstStyle/>
-            <a:p>
-              <a:pPr>
-                <a:defRPr sz="1000" b="0" i="0" u="none" strike="noStrike" kern="1200" baseline="0">
-                  <a:solidFill>
-                    <a:schemeClr val="tx1">
-                      <a:lumMod val="65000"/>
-                      <a:lumOff val="35000"/>
-                    </a:schemeClr>
-                  </a:solidFill>
-                  <a:latin typeface="+mn-lt"/>
-                  <a:ea typeface="+mn-ea"/>
-                  <a:cs typeface="+mn-cs"/>
-                </a:defRPr>
-              </a:pPr>
-              <a:endParaRPr lang="en-US"/>
-            </a:p>
-          </c:txPr>
         </c:title>
         <c:numFmt formatCode="General" sourceLinked="1"/>
         <c:majorTickMark val="none"/>
@@ -1298,7 +1258,7 @@
             <a:endParaRPr lang="en-US"/>
           </a:p>
         </c:txPr>
-        <c:crossAx val="251081272"/>
+        <c:crossAx val="39249408"/>
         <c:crosses val="autoZero"/>
         <c:crossBetween val="between"/>
       </c:valAx>
@@ -1370,7 +1330,7 @@
       <a:endParaRPr lang="en-US"/>
     </a:p>
   </c:txPr>
-  <c:externalData r:id="rId3">
+  <c:externalData r:id="rId1">
     <c:autoUpdate val="0"/>
   </c:externalData>
 </c:chartSpace>
@@ -1562,11 +1522,11 @@
           <c:showBubbleSize val="0"/>
         </c:dLbls>
         <c:gapWidth val="150"/>
-        <c:axId val="251075392"/>
-        <c:axId val="251075784"/>
+        <c:axId val="48458240"/>
+        <c:axId val="40302784"/>
       </c:barChart>
       <c:catAx>
-        <c:axId val="251075392"/>
+        <c:axId val="48458240"/>
         <c:scaling>
           <c:orientation val="minMax"/>
         </c:scaling>
@@ -1609,7 +1569,7 @@
             <a:endParaRPr lang="en-US"/>
           </a:p>
         </c:txPr>
-        <c:crossAx val="251075784"/>
+        <c:crossAx val="40302784"/>
         <c:crosses val="autoZero"/>
         <c:auto val="1"/>
         <c:lblAlgn val="ctr"/>
@@ -1617,7 +1577,7 @@
         <c:noMultiLvlLbl val="0"/>
       </c:catAx>
       <c:valAx>
-        <c:axId val="251075784"/>
+        <c:axId val="40302784"/>
         <c:scaling>
           <c:orientation val="minMax"/>
         </c:scaling>
@@ -1704,7 +1664,7 @@
             <a:endParaRPr lang="en-US"/>
           </a:p>
         </c:txPr>
-        <c:crossAx val="251075392"/>
+        <c:crossAx val="48458240"/>
         <c:crosses val="autoZero"/>
         <c:crossBetween val="between"/>
       </c:valAx>
@@ -1845,32 +1805,6 @@
         </a:ln>
         <a:effectLst/>
       </c:spPr>
-      <c:txPr>
-        <a:bodyPr rot="0" spcFirstLastPara="1" vertOverflow="ellipsis" vert="horz" wrap="square" anchor="ctr" anchorCtr="1"/>
-        <a:lstStyle/>
-        <a:p>
-          <a:pPr>
-            <a:defRPr sz="1600" b="1" i="0" u="none" strike="noStrike" kern="1200" spc="100" baseline="0">
-              <a:solidFill>
-                <a:schemeClr val="lt1">
-                  <a:lumMod val="95000"/>
-                </a:schemeClr>
-              </a:solidFill>
-              <a:effectLst>
-                <a:outerShdw blurRad="50800" dist="38100" dir="5400000" algn="t" rotWithShape="0">
-                  <a:prstClr val="black">
-                    <a:alpha val="40000"/>
-                  </a:prstClr>
-                </a:outerShdw>
-              </a:effectLst>
-              <a:latin typeface="+mn-lt"/>
-              <a:ea typeface="+mn-ea"/>
-              <a:cs typeface="+mn-cs"/>
-            </a:defRPr>
-          </a:pPr>
-          <a:endParaRPr lang="en-US"/>
-        </a:p>
-      </c:txPr>
     </c:title>
     <c:autoTitleDeleted val="0"/>
     <c:plotArea>
@@ -2391,11 +2325,11 @@
           <c:showBubbleSize val="0"/>
         </c:dLbls>
         <c:gapWidth val="150"/>
-        <c:axId val="250067688"/>
-        <c:axId val="250068864"/>
+        <c:axId val="46082560"/>
+        <c:axId val="140307264"/>
       </c:barChart>
       <c:catAx>
-        <c:axId val="250067688"/>
+        <c:axId val="46082560"/>
         <c:scaling>
           <c:orientation val="minMax"/>
         </c:scaling>
@@ -2437,7 +2371,7 @@
             <a:endParaRPr lang="en-US"/>
           </a:p>
         </c:txPr>
-        <c:crossAx val="250068864"/>
+        <c:crossAx val="140307264"/>
         <c:crosses val="autoZero"/>
         <c:auto val="1"/>
         <c:lblAlgn val="ctr"/>
@@ -2445,7 +2379,7 @@
         <c:noMultiLvlLbl val="0"/>
       </c:catAx>
       <c:valAx>
-        <c:axId val="250068864"/>
+        <c:axId val="140307264"/>
         <c:scaling>
           <c:orientation val="minMax"/>
         </c:scaling>
@@ -2495,7 +2429,7 @@
             <a:endParaRPr lang="en-US"/>
           </a:p>
         </c:txPr>
-        <c:crossAx val="250067688"/>
+        <c:crossAx val="46082560"/>
         <c:crosses val="autoZero"/>
         <c:crossBetween val="between"/>
       </c:valAx>
@@ -2578,7 +2512,7 @@
       <a:endParaRPr lang="en-US"/>
     </a:p>
   </c:txPr>
-  <c:externalData r:id="rId3">
+  <c:externalData r:id="rId1">
     <c:autoUpdate val="0"/>
   </c:externalData>
 </c:chartSpace>
@@ -2639,32 +2573,6 @@
         </a:ln>
         <a:effectLst/>
       </c:spPr>
-      <c:txPr>
-        <a:bodyPr rot="0" spcFirstLastPara="1" vertOverflow="ellipsis" vert="horz" wrap="square" anchor="ctr" anchorCtr="1"/>
-        <a:lstStyle/>
-        <a:p>
-          <a:pPr>
-            <a:defRPr sz="2128" b="1" i="0" u="none" strike="noStrike" kern="1200" spc="100" baseline="0">
-              <a:solidFill>
-                <a:schemeClr val="lt1">
-                  <a:lumMod val="95000"/>
-                </a:schemeClr>
-              </a:solidFill>
-              <a:effectLst>
-                <a:outerShdw blurRad="50800" dist="38100" dir="5400000" algn="t" rotWithShape="0">
-                  <a:prstClr val="black">
-                    <a:alpha val="40000"/>
-                  </a:prstClr>
-                </a:outerShdw>
-              </a:effectLst>
-              <a:latin typeface="+mn-lt"/>
-              <a:ea typeface="+mn-ea"/>
-              <a:cs typeface="+mn-cs"/>
-            </a:defRPr>
-          </a:pPr>
-          <a:endParaRPr lang="en-US"/>
-        </a:p>
-      </c:txPr>
     </c:title>
     <c:autoTitleDeleted val="0"/>
     <c:plotArea>
@@ -2950,11 +2858,11 @@
         </c:dLbls>
         <c:gapWidth val="115"/>
         <c:overlap val="-20"/>
-        <c:axId val="247627872"/>
-        <c:axId val="247629048"/>
+        <c:axId val="48569856"/>
+        <c:axId val="140308992"/>
       </c:barChart>
       <c:catAx>
-        <c:axId val="247627872"/>
+        <c:axId val="48569856"/>
         <c:scaling>
           <c:orientation val="minMax"/>
         </c:scaling>
@@ -2996,7 +2904,7 @@
             <a:endParaRPr lang="en-US"/>
           </a:p>
         </c:txPr>
-        <c:crossAx val="247629048"/>
+        <c:crossAx val="140308992"/>
         <c:crosses val="autoZero"/>
         <c:auto val="1"/>
         <c:lblAlgn val="ctr"/>
@@ -3004,7 +2912,7 @@
         <c:noMultiLvlLbl val="0"/>
       </c:catAx>
       <c:valAx>
-        <c:axId val="247629048"/>
+        <c:axId val="140308992"/>
         <c:scaling>
           <c:orientation val="minMax"/>
         </c:scaling>
@@ -3054,7 +2962,7 @@
             <a:endParaRPr lang="en-US"/>
           </a:p>
         </c:txPr>
-        <c:crossAx val="247627872"/>
+        <c:crossAx val="48569856"/>
         <c:crosses val="autoZero"/>
         <c:crossBetween val="between"/>
       </c:valAx>
@@ -3137,7 +3045,7 @@
       <a:endParaRPr lang="en-US"/>
     </a:p>
   </c:txPr>
-  <c:externalData r:id="rId3">
+  <c:externalData r:id="rId1">
     <c:autoUpdate val="0"/>
   </c:externalData>
 </c:chartSpace>
@@ -4943,7 +4851,7 @@
           <a:p>
             <a:fld id="{45F8B078-4D02-45C3-B284-451A14CEFD4C}" type="datetimeFigureOut">
               <a:rPr lang="en-US" smtClean="0"/>
-              <a:t>11/23/2015</a:t>
+              <a:t>11/24/2015</a:t>
             </a:fld>
             <a:endParaRPr lang="en-US"/>
           </a:p>
@@ -5284,7 +5192,7 @@
           <a:p>
             <a:fld id="{45F8B078-4D02-45C3-B284-451A14CEFD4C}" type="datetimeFigureOut">
               <a:rPr lang="en-US" smtClean="0"/>
-              <a:t>11/23/2015</a:t>
+              <a:t>11/24/2015</a:t>
             </a:fld>
             <a:endParaRPr lang="en-US"/>
           </a:p>
@@ -5688,7 +5596,7 @@
           <a:p>
             <a:fld id="{45F8B078-4D02-45C3-B284-451A14CEFD4C}" type="datetimeFigureOut">
               <a:rPr lang="en-US" smtClean="0"/>
-              <a:t>11/23/2015</a:t>
+              <a:t>11/24/2015</a:t>
             </a:fld>
             <a:endParaRPr lang="en-US"/>
           </a:p>
@@ -6027,7 +5935,7 @@
           <a:p>
             <a:fld id="{45F8B078-4D02-45C3-B284-451A14CEFD4C}" type="datetimeFigureOut">
               <a:rPr lang="en-US" smtClean="0"/>
-              <a:t>11/23/2015</a:t>
+              <a:t>11/24/2015</a:t>
             </a:fld>
             <a:endParaRPr lang="en-US"/>
           </a:p>
@@ -6350,7 +6258,7 @@
           <a:p>
             <a:fld id="{45F8B078-4D02-45C3-B284-451A14CEFD4C}" type="datetimeFigureOut">
               <a:rPr lang="en-US" smtClean="0"/>
-              <a:t>11/23/2015</a:t>
+              <a:t>11/24/2015</a:t>
             </a:fld>
             <a:endParaRPr lang="en-US"/>
           </a:p>
@@ -6749,7 +6657,7 @@
           <a:p>
             <a:fld id="{45F8B078-4D02-45C3-B284-451A14CEFD4C}" type="datetimeFigureOut">
               <a:rPr lang="en-US" smtClean="0"/>
-              <a:t>11/23/2015</a:t>
+              <a:t>11/24/2015</a:t>
             </a:fld>
             <a:endParaRPr lang="en-US"/>
           </a:p>
@@ -7009,7 +6917,7 @@
           <a:p>
             <a:fld id="{45F8B078-4D02-45C3-B284-451A14CEFD4C}" type="datetimeFigureOut">
               <a:rPr lang="en-US" smtClean="0"/>
-              <a:t>11/23/2015</a:t>
+              <a:t>11/24/2015</a:t>
             </a:fld>
             <a:endParaRPr lang="en-US"/>
           </a:p>
@@ -7274,7 +7182,7 @@
           <a:p>
             <a:fld id="{45F8B078-4D02-45C3-B284-451A14CEFD4C}" type="datetimeFigureOut">
               <a:rPr lang="en-US" smtClean="0"/>
-              <a:t>11/23/2015</a:t>
+              <a:t>11/24/2015</a:t>
             </a:fld>
             <a:endParaRPr lang="en-US"/>
           </a:p>
@@ -7539,7 +7447,7 @@
           <a:p>
             <a:fld id="{45F8B078-4D02-45C3-B284-451A14CEFD4C}" type="datetimeFigureOut">
               <a:rPr lang="en-US" smtClean="0"/>
-              <a:t>11/23/2015</a:t>
+              <a:t>11/24/2015</a:t>
             </a:fld>
             <a:endParaRPr lang="en-US"/>
           </a:p>
@@ -7871,7 +7779,7 @@
           <a:p>
             <a:fld id="{45F8B078-4D02-45C3-B284-451A14CEFD4C}" type="datetimeFigureOut">
               <a:rPr lang="en-US" smtClean="0"/>
-              <a:t>11/23/2015</a:t>
+              <a:t>11/24/2015</a:t>
             </a:fld>
             <a:endParaRPr lang="en-US"/>
           </a:p>
@@ -8197,7 +8105,7 @@
           <a:p>
             <a:fld id="{45F8B078-4D02-45C3-B284-451A14CEFD4C}" type="datetimeFigureOut">
               <a:rPr lang="en-US" smtClean="0"/>
-              <a:t>11/23/2015</a:t>
+              <a:t>11/24/2015</a:t>
             </a:fld>
             <a:endParaRPr lang="en-US"/>
           </a:p>
@@ -8657,7 +8565,7 @@
           <a:p>
             <a:fld id="{45F8B078-4D02-45C3-B284-451A14CEFD4C}" type="datetimeFigureOut">
               <a:rPr lang="en-US" smtClean="0"/>
-              <a:t>11/23/2015</a:t>
+              <a:t>11/24/2015</a:t>
             </a:fld>
             <a:endParaRPr lang="en-US"/>
           </a:p>
@@ -8865,7 +8773,7 @@
           <a:p>
             <a:fld id="{45F8B078-4D02-45C3-B284-451A14CEFD4C}" type="datetimeFigureOut">
               <a:rPr lang="en-US" smtClean="0"/>
-              <a:t>11/23/2015</a:t>
+              <a:t>11/24/2015</a:t>
             </a:fld>
             <a:endParaRPr lang="en-US"/>
           </a:p>
@@ -9045,7 +8953,7 @@
           <a:p>
             <a:fld id="{45F8B078-4D02-45C3-B284-451A14CEFD4C}" type="datetimeFigureOut">
               <a:rPr lang="en-US" smtClean="0"/>
-              <a:t>11/23/2015</a:t>
+              <a:t>11/24/2015</a:t>
             </a:fld>
             <a:endParaRPr lang="en-US"/>
           </a:p>
@@ -9381,7 +9289,7 @@
           <a:p>
             <a:fld id="{45F8B078-4D02-45C3-B284-451A14CEFD4C}" type="datetimeFigureOut">
               <a:rPr lang="en-US" smtClean="0"/>
-              <a:t>11/23/2015</a:t>
+              <a:t>11/24/2015</a:t>
             </a:fld>
             <a:endParaRPr lang="en-US"/>
           </a:p>
@@ -9729,7 +9637,7 @@
           <a:p>
             <a:fld id="{45F8B078-4D02-45C3-B284-451A14CEFD4C}" type="datetimeFigureOut">
               <a:rPr lang="en-US" smtClean="0"/>
-              <a:t>11/23/2015</a:t>
+              <a:t>11/24/2015</a:t>
             </a:fld>
             <a:endParaRPr lang="en-US"/>
           </a:p>
@@ -11849,7 +11757,7 @@
           <a:p>
             <a:fld id="{45F8B078-4D02-45C3-B284-451A14CEFD4C}" type="datetimeFigureOut">
               <a:rPr lang="en-US" smtClean="0"/>
-              <a:t>11/23/2015</a:t>
+              <a:t>11/24/2015</a:t>
             </a:fld>
             <a:endParaRPr lang="en-US"/>
           </a:p>
@@ -12405,8 +12313,8 @@
         </p:nvSpPr>
         <p:spPr>
           <a:xfrm>
-            <a:off x="2589213" y="4777379"/>
-            <a:ext cx="9478291" cy="1126283"/>
+            <a:off x="2737834" y="4794963"/>
+            <a:ext cx="8067064" cy="1126283"/>
           </a:xfrm>
         </p:spPr>
         <p:txBody>
@@ -12456,8 +12364,8 @@
         </p:blipFill>
         <p:spPr bwMode="auto">
           <a:xfrm>
-            <a:off x="2737834" y="666750"/>
-            <a:ext cx="8305800" cy="1828800"/>
+            <a:off x="2737834" y="1880088"/>
+            <a:ext cx="8072867" cy="1777512"/>
           </a:xfrm>
           <a:prstGeom prst="rect">
             <a:avLst/>
@@ -12467,15 +12375,15 @@
             <a:noFill/>
           </a:ln>
           <a:extLst>
-            <a:ext uri="{909E8E84-426E-40dd-AFC4-6F175D3DCCD1}">
-              <a14:hiddenFill xmlns:a14="http://schemas.microsoft.com/office/drawing/2010/main" xmlns="">
+            <a:ext uri="{909E8E84-426E-40DD-AFC4-6F175D3DCCD1}">
+              <a14:hiddenFill xmlns:a14="http://schemas.microsoft.com/office/drawing/2010/main">
                 <a:solidFill>
                   <a:srgbClr val="FFFFFF"/>
                 </a:solidFill>
               </a14:hiddenFill>
             </a:ext>
-            <a:ext uri="{91240B29-F687-4f45-9708-019B960494DF}">
-              <a14:hiddenLine xmlns:a14="http://schemas.microsoft.com/office/drawing/2010/main" xmlns="" w="9525">
+            <a:ext uri="{91240B29-F687-4F45-9708-019B960494DF}">
+              <a14:hiddenLine xmlns:a14="http://schemas.microsoft.com/office/drawing/2010/main" w="9525">
                 <a:solidFill>
                   <a:srgbClr val="000000"/>
                 </a:solidFill>
@@ -12905,7 +12813,6 @@
               <a:rPr lang="en-US" dirty="0"/>
               <a:t>Distance method may still be the optimal choice for comparing larger data such as manuscript drafts. </a:t>
             </a:r>
-            <a:endParaRPr lang="en-US" dirty="0"/>
           </a:p>
           <a:p>
             <a:r>
@@ -13630,10 +13537,6 @@
             <a:r>
               <a:rPr lang="en-US" dirty="0" smtClean="0"/>
               <a:t>The Goals of the Project</a:t>
-            </a:r>
-            <a:r>
-              <a:rPr lang="en-US" dirty="0" smtClean="0"/>
-              <a:t/>
             </a:r>
             <a:br>
               <a:rPr lang="en-US" dirty="0" smtClean="0"/>
@@ -14165,15 +14068,7 @@
             <a:pPr lvl="1"/>
             <a:r>
               <a:rPr lang="en-US" dirty="0" smtClean="0"/>
-              <a:t>Code </a:t>
-            </a:r>
-            <a:r>
-              <a:rPr lang="en-US" dirty="0" err="1" smtClean="0"/>
-              <a:t>Levenshtein’s</a:t>
-            </a:r>
-            <a:r>
-              <a:rPr lang="en-US" dirty="0" smtClean="0"/>
-              <a:t> Distance algorithm</a:t>
+              <a:t>Code Levenshtein’s Distance algorithm</a:t>
             </a:r>
           </a:p>
           <a:p>
@@ -14232,11 +14127,7 @@
             </a:pPr>
             <a:r>
               <a:rPr lang="en-US" dirty="0" smtClean="0"/>
-              <a:t>Results </a:t>
-            </a:r>
-            <a:r>
-              <a:rPr lang="en-US" dirty="0" smtClean="0"/>
-              <a:t>and Writing</a:t>
+              <a:t>Results and Writing</a:t>
             </a:r>
           </a:p>
           <a:p>
@@ -15204,8 +15095,8 @@
           </a:p>
         </p:txBody>
       </p:sp>
-      <mc:AlternateContent xmlns:mc="http://schemas.openxmlformats.org/markup-compatibility/2006">
-        <mc:Choice xmlns:a14="http://schemas.microsoft.com/office/drawing/2010/main" Requires="a14">
+      <mc:AlternateContent xmlns:mc="http://schemas.openxmlformats.org/markup-compatibility/2006" xmlns:a14="http://schemas.microsoft.com/office/drawing/2010/main">
+        <mc:Choice Requires="a14">
           <p:sp>
             <p:nvSpPr>
               <p:cNvPr id="8" name="Content Placeholder 7"/>
@@ -15247,7 +15138,6 @@
                   <a:rPr lang="en-US" dirty="0" smtClean="0"/>
                   <a:t>Obtain the Jaro score of two strings being compared </a:t>
                 </a:r>
-                <a:endParaRPr lang="en-US" dirty="0" smtClean="0"/>
               </a:p>
               <a:p>
                 <a:pPr marL="1200150" lvl="2" indent="-342900"/>
@@ -15257,7 +15147,7 @@
                       <m:sSubPr>
                         <m:ctrlPr>
                           <a:rPr lang="en-US" i="1">
-                            <a:latin typeface="Cambria Math" panose="02040503050406030204" pitchFamily="18" charset="0"/>
+                            <a:latin typeface="Cambria Math"/>
                           </a:rPr>
                         </m:ctrlPr>
                       </m:sSubPr>
@@ -15290,7 +15180,7 @@
                         <m:endChr m:val=""/>
                         <m:ctrlPr>
                           <a:rPr lang="en-US" i="1">
-                            <a:latin typeface="Cambria Math" panose="02040503050406030204" pitchFamily="18" charset="0"/>
+                            <a:latin typeface="Cambria Math"/>
                           </a:rPr>
                         </m:ctrlPr>
                       </m:dPr>
@@ -15299,7 +15189,7 @@
                           <m:eqArrPr>
                             <m:ctrlPr>
                               <a:rPr lang="en-US" i="1">
-                                <a:latin typeface="Cambria Math" panose="02040503050406030204" pitchFamily="18" charset="0"/>
+                                <a:latin typeface="Cambria Math"/>
                               </a:rPr>
                             </m:ctrlPr>
                           </m:eqArrPr>
@@ -15346,7 +15236,7 @@
                               <m:fPr>
                                 <m:ctrlPr>
                                   <a:rPr lang="en-US" i="1">
-                                    <a:latin typeface="Cambria Math" panose="02040503050406030204" pitchFamily="18" charset="0"/>
+                                    <a:latin typeface="Cambria Math"/>
                                   </a:rPr>
                                 </m:ctrlPr>
                               </m:fPr>
@@ -15371,7 +15261,7 @@
                               <m:dPr>
                                 <m:ctrlPr>
                                   <a:rPr lang="en-US" i="1">
-                                    <a:latin typeface="Cambria Math" panose="02040503050406030204" pitchFamily="18" charset="0"/>
+                                    <a:latin typeface="Cambria Math"/>
                                   </a:rPr>
                                 </m:ctrlPr>
                               </m:dPr>
@@ -15380,7 +15270,7 @@
                                   <m:fPr>
                                     <m:ctrlPr>
                                       <a:rPr lang="en-US" i="1">
-                                        <a:latin typeface="Cambria Math" panose="02040503050406030204" pitchFamily="18" charset="0"/>
+                                        <a:latin typeface="Cambria Math"/>
                                       </a:rPr>
                                     </m:ctrlPr>
                                   </m:fPr>
@@ -15399,7 +15289,7 @@
                                         <m:endChr m:val="|"/>
                                         <m:ctrlPr>
                                           <a:rPr lang="en-US" i="1">
-                                            <a:latin typeface="Cambria Math" panose="02040503050406030204" pitchFamily="18" charset="0"/>
+                                            <a:latin typeface="Cambria Math"/>
                                           </a:rPr>
                                         </m:ctrlPr>
                                       </m:dPr>
@@ -15408,7 +15298,7 @@
                                           <m:sSubPr>
                                             <m:ctrlPr>
                                               <a:rPr lang="en-US" i="1">
-                                                <a:latin typeface="Cambria Math" panose="02040503050406030204" pitchFamily="18" charset="0"/>
+                                                <a:latin typeface="Cambria Math"/>
                                               </a:rPr>
                                             </m:ctrlPr>
                                           </m:sSubPr>
@@ -15443,7 +15333,7 @@
                                   <m:fPr>
                                     <m:ctrlPr>
                                       <a:rPr lang="en-US" i="1">
-                                        <a:latin typeface="Cambria Math" panose="02040503050406030204" pitchFamily="18" charset="0"/>
+                                        <a:latin typeface="Cambria Math"/>
                                       </a:rPr>
                                     </m:ctrlPr>
                                   </m:fPr>
@@ -15462,7 +15352,7 @@
                                         <m:endChr m:val="|"/>
                                         <m:ctrlPr>
                                           <a:rPr lang="en-US" i="1">
-                                            <a:latin typeface="Cambria Math" panose="02040503050406030204" pitchFamily="18" charset="0"/>
+                                            <a:latin typeface="Cambria Math"/>
                                           </a:rPr>
                                         </m:ctrlPr>
                                       </m:dPr>
@@ -15471,7 +15361,7 @@
                                           <m:sSubPr>
                                             <m:ctrlPr>
                                               <a:rPr lang="en-US" i="1">
-                                                <a:latin typeface="Cambria Math" panose="02040503050406030204" pitchFamily="18" charset="0"/>
+                                                <a:latin typeface="Cambria Math"/>
                                               </a:rPr>
                                             </m:ctrlPr>
                                           </m:sSubPr>
@@ -15506,7 +15396,7 @@
                                   <m:fPr>
                                     <m:ctrlPr>
                                       <a:rPr lang="en-US" i="1">
-                                        <a:latin typeface="Cambria Math" panose="02040503050406030204" pitchFamily="18" charset="0"/>
+                                        <a:latin typeface="Cambria Math"/>
                                       </a:rPr>
                                     </m:ctrlPr>
                                   </m:fPr>
@@ -15582,7 +15472,7 @@
                         <m:endChr m:val="⌋"/>
                         <m:ctrlPr>
                           <a:rPr lang="en-US" i="1" smtClean="0">
-                            <a:latin typeface="Cambria Math" panose="02040503050406030204" pitchFamily="18" charset="0"/>
+                            <a:latin typeface="Cambria Math"/>
                           </a:rPr>
                         </m:ctrlPr>
                       </m:dPr>
@@ -15591,7 +15481,7 @@
                           <m:fPr>
                             <m:ctrlPr>
                               <a:rPr lang="en-US" i="1" smtClean="0">
-                                <a:latin typeface="Cambria Math" panose="02040503050406030204" pitchFamily="18" charset="0"/>
+                                <a:latin typeface="Cambria Math"/>
                               </a:rPr>
                             </m:ctrlPr>
                           </m:fPr>
@@ -15617,7 +15507,7 @@
                                 <m:endChr m:val="|"/>
                                 <m:ctrlPr>
                                   <a:rPr lang="en-US" b="0" i="1" smtClean="0">
-                                    <a:latin typeface="Cambria Math" panose="02040503050406030204" pitchFamily="18" charset="0"/>
+                                    <a:latin typeface="Cambria Math"/>
                                   </a:rPr>
                                 </m:ctrlPr>
                               </m:dPr>
@@ -15626,7 +15516,7 @@
                                   <m:sSubPr>
                                     <m:ctrlPr>
                                       <a:rPr lang="en-US" b="0" i="1" smtClean="0">
-                                        <a:latin typeface="Cambria Math" panose="02040503050406030204" pitchFamily="18" charset="0"/>
+                                        <a:latin typeface="Cambria Math"/>
                                       </a:rPr>
                                     </m:ctrlPr>
                                   </m:sSubPr>
@@ -15661,7 +15551,7 @@
                                 <m:endChr m:val="|"/>
                                 <m:ctrlPr>
                                   <a:rPr lang="en-US" b="0" i="1" smtClean="0">
-                                    <a:latin typeface="Cambria Math" panose="02040503050406030204" pitchFamily="18" charset="0"/>
+                                    <a:latin typeface="Cambria Math"/>
                                   </a:rPr>
                                 </m:ctrlPr>
                               </m:dPr>
@@ -15670,7 +15560,7 @@
                                   <m:sSubPr>
                                     <m:ctrlPr>
                                       <a:rPr lang="en-US" b="0" i="1" smtClean="0">
-                                        <a:latin typeface="Cambria Math" panose="02040503050406030204" pitchFamily="18" charset="0"/>
+                                        <a:latin typeface="Cambria Math"/>
                                       </a:rPr>
                                     </m:ctrlPr>
                                   </m:sSubPr>
@@ -15728,15 +15618,7 @@
                 </a:pPr>
                 <a:r>
                   <a:rPr lang="en-US" dirty="0" smtClean="0"/>
-                  <a:t>Obtain </a:t>
-                </a:r>
-                <a:r>
-                  <a:rPr lang="en-US" dirty="0" smtClean="0"/>
-                  <a:t>Jaro-Winkler  score by determining if arbitrary boost threshold is met and apply boost prefix if </a:t>
-                </a:r>
-                <a:r>
-                  <a:rPr lang="en-US" dirty="0" smtClean="0"/>
-                  <a:t>so:</a:t>
+                  <a:t>Obtain Jaro-Winkler  score by determining if arbitrary boost threshold is met and apply boost prefix if so:</a:t>
                 </a:r>
               </a:p>
               <a:p>
@@ -15747,7 +15629,7 @@
                       <m:sSubPr>
                         <m:ctrlPr>
                           <a:rPr lang="en-US" i="1" smtClean="0">
-                            <a:latin typeface="Cambria Math" panose="02040503050406030204" pitchFamily="18" charset="0"/>
+                            <a:latin typeface="Cambria Math"/>
                           </a:rPr>
                         </m:ctrlPr>
                       </m:sSubPr>
@@ -15780,7 +15662,7 @@
                         <m:endChr m:val=""/>
                         <m:ctrlPr>
                           <a:rPr lang="en-US" b="0" i="1" smtClean="0">
-                            <a:latin typeface="Cambria Math" panose="02040503050406030204" pitchFamily="18" charset="0"/>
+                            <a:latin typeface="Cambria Math"/>
                           </a:rPr>
                         </m:ctrlPr>
                       </m:dPr>
@@ -15789,7 +15671,7 @@
                           <m:eqArrPr>
                             <m:ctrlPr>
                               <a:rPr lang="en-US" b="0" i="1" smtClean="0">
-                                <a:latin typeface="Cambria Math" panose="02040503050406030204" pitchFamily="18" charset="0"/>
+                                <a:latin typeface="Cambria Math"/>
                               </a:rPr>
                             </m:ctrlPr>
                           </m:eqArrPr>
@@ -15798,7 +15680,7 @@
                               <m:sSubPr>
                                 <m:ctrlPr>
                                   <a:rPr lang="en-US" b="0" i="1" smtClean="0">
-                                    <a:latin typeface="Cambria Math" panose="02040503050406030204" pitchFamily="18" charset="0"/>
+                                    <a:latin typeface="Cambria Math"/>
                                   </a:rPr>
                                 </m:ctrlPr>
                               </m:sSubPr>
@@ -15854,7 +15736,7 @@
                                   <m:sSubPr>
                                     <m:ctrlPr>
                                       <a:rPr lang="en-US" b="0" i="1" smtClean="0">
-                                        <a:latin typeface="Cambria Math" panose="02040503050406030204" pitchFamily="18" charset="0"/>
+                                        <a:latin typeface="Cambria Math"/>
                                       </a:rPr>
                                     </m:ctrlPr>
                                   </m:sSubPr>
@@ -15885,7 +15767,7 @@
                                   <m:sSubPr>
                                     <m:ctrlPr>
                                       <a:rPr lang="en-US" b="0" i="1" smtClean="0">
-                                        <a:latin typeface="Cambria Math" panose="02040503050406030204" pitchFamily="18" charset="0"/>
+                                        <a:latin typeface="Cambria Math"/>
                                       </a:rPr>
                                     </m:ctrlPr>
                                   </m:sSubPr>
@@ -15920,7 +15802,7 @@
                               <m:sSubPr>
                                 <m:ctrlPr>
                                   <a:rPr lang="en-US" b="0" i="1" smtClean="0">
-                                    <a:latin typeface="Cambria Math" panose="02040503050406030204" pitchFamily="18" charset="0"/>
+                                    <a:latin typeface="Cambria Math"/>
                                   </a:rPr>
                                 </m:ctrlPr>
                               </m:sSubPr>
@@ -15951,7 +15833,7 @@
                               <m:dPr>
                                 <m:ctrlPr>
                                   <a:rPr lang="en-US" b="0" i="1" smtClean="0">
-                                    <a:latin typeface="Cambria Math" panose="02040503050406030204" pitchFamily="18" charset="0"/>
+                                    <a:latin typeface="Cambria Math"/>
                                   </a:rPr>
                                 </m:ctrlPr>
                               </m:dPr>
@@ -15966,7 +15848,7 @@
                                   <m:dPr>
                                     <m:ctrlPr>
                                       <a:rPr lang="en-US" b="0" i="1" smtClean="0">
-                                        <a:latin typeface="Cambria Math" panose="02040503050406030204" pitchFamily="18" charset="0"/>
+                                        <a:latin typeface="Cambria Math"/>
                                       </a:rPr>
                                     </m:ctrlPr>
                                   </m:dPr>
@@ -15981,7 +15863,7 @@
                                       <m:sSubPr>
                                         <m:ctrlPr>
                                           <a:rPr lang="en-US" b="0" i="1" smtClean="0">
-                                            <a:latin typeface="Cambria Math" panose="02040503050406030204" pitchFamily="18" charset="0"/>
+                                            <a:latin typeface="Cambria Math"/>
                                           </a:rPr>
                                         </m:ctrlPr>
                                       </m:sSubPr>
@@ -16033,33 +15915,21 @@
                 <a:pPr marL="1200150" lvl="2" indent="-342900"/>
                 <a:r>
                   <a:rPr lang="en-US" dirty="0" smtClean="0"/>
-                  <a:t>Where </a:t>
-                </a:r>
-                <a:r>
-                  <a:rPr lang="en-US" dirty="0" smtClean="0"/>
-                  <a:t>l is the length of the common prefix of the strings and p is a constant scaling </a:t>
-                </a:r>
-                <a:r>
-                  <a:rPr lang="en-US" dirty="0" smtClean="0"/>
-                  <a:t>factor</a:t>
+                  <a:t>Where l is the length of the common prefix of the strings and p is a constant scaling factor</a:t>
                 </a:r>
               </a:p>
               <a:p>
                 <a:pPr marL="1200150" lvl="2" indent="-342900"/>
                 <a:r>
                   <a:rPr lang="en-US" dirty="0" smtClean="0"/>
-                  <a:t>Some </a:t>
-                </a:r>
-                <a:r>
-                  <a:rPr lang="en-US" dirty="0" smtClean="0"/>
-                  <a:t>implementations do not make use of the boost threshold and would always fall in the otherwise formula</a:t>
+                  <a:t>Some implementations do not make use of the boost threshold and would always fall in the otherwise formula</a:t>
                 </a:r>
                 <a:endParaRPr lang="en-US" dirty="0"/>
               </a:p>
             </p:txBody>
           </p:sp>
         </mc:Choice>
-        <mc:Fallback>
+        <mc:Fallback xmlns="">
           <p:sp>
             <p:nvSpPr>
               <p:cNvPr id="8" name="Content Placeholder 7"/>
@@ -16889,7 +16759,7 @@
                       <m:sSubPr>
                         <m:ctrlPr>
                           <a:rPr lang="en-US" i="1" smtClean="0">
-                            <a:latin typeface="Cambria Math" panose="02040503050406030204" pitchFamily="18" charset="0"/>
+                            <a:latin typeface="Cambria Math"/>
                           </a:rPr>
                         </m:ctrlPr>
                       </m:sSubPr>
@@ -16946,7 +16816,7 @@
                       <m:sSubPr>
                         <m:ctrlPr>
                           <a:rPr lang="en-US" i="1">
-                            <a:latin typeface="Cambria Math" panose="02040503050406030204" pitchFamily="18" charset="0"/>
+                            <a:latin typeface="Cambria Math"/>
                           </a:rPr>
                         </m:ctrlPr>
                       </m:sSubPr>
@@ -17007,7 +16877,7 @@
                       <m:sSubPr>
                         <m:ctrlPr>
                           <a:rPr lang="en-US" i="1" smtClean="0">
-                            <a:latin typeface="Cambria Math" panose="02040503050406030204" pitchFamily="18" charset="0"/>
+                            <a:latin typeface="Cambria Math"/>
                           </a:rPr>
                         </m:ctrlPr>
                       </m:sSubPr>
@@ -17076,7 +16946,7 @@
                       <m:sSubPr>
                         <m:ctrlPr>
                           <a:rPr lang="en-US" i="1">
-                            <a:latin typeface="Cambria Math" panose="02040503050406030204" pitchFamily="18" charset="0"/>
+                            <a:latin typeface="Cambria Math"/>
                           </a:rPr>
                         </m:ctrlPr>
                       </m:sSubPr>
@@ -17145,7 +17015,7 @@
                       <m:sSubPr>
                         <m:ctrlPr>
                           <a:rPr lang="en-US" i="1">
-                            <a:latin typeface="Cambria Math" panose="02040503050406030204" pitchFamily="18" charset="0"/>
+                            <a:latin typeface="Cambria Math"/>
                           </a:rPr>
                         </m:ctrlPr>
                       </m:sSubPr>
@@ -17178,7 +17048,7 @@
                         <m:endChr m:val=""/>
                         <m:ctrlPr>
                           <a:rPr lang="en-US" i="1">
-                            <a:latin typeface="Cambria Math" panose="02040503050406030204" pitchFamily="18" charset="0"/>
+                            <a:latin typeface="Cambria Math"/>
                           </a:rPr>
                         </m:ctrlPr>
                       </m:dPr>
@@ -17187,7 +17057,7 @@
                           <m:eqArrPr>
                             <m:ctrlPr>
                               <a:rPr lang="en-US" i="1">
-                                <a:latin typeface="Cambria Math" panose="02040503050406030204" pitchFamily="18" charset="0"/>
+                                <a:latin typeface="Cambria Math"/>
                               </a:rPr>
                             </m:ctrlPr>
                           </m:eqArrPr>
@@ -17202,7 +17072,7 @@
                               <m:sSubPr>
                                 <m:ctrlPr>
                                   <a:rPr lang="en-US" i="1">
-                                    <a:latin typeface="Cambria Math" panose="02040503050406030204" pitchFamily="18" charset="0"/>
+                                    <a:latin typeface="Cambria Math"/>
                                   </a:rPr>
                                 </m:ctrlPr>
                               </m:sSubPr>
@@ -17265,7 +17135,7 @@
                               <m:sSubPr>
                                 <m:ctrlPr>
                                   <a:rPr lang="en-US" i="1">
-                                    <a:latin typeface="Cambria Math" panose="02040503050406030204" pitchFamily="18" charset="0"/>
+                                    <a:latin typeface="Cambria Math"/>
                                   </a:rPr>
                                 </m:ctrlPr>
                               </m:sSubPr>
@@ -17296,7 +17166,7 @@
                               <m:sSubPr>
                                 <m:ctrlPr>
                                   <a:rPr lang="en-US" i="1">
-                                    <a:latin typeface="Cambria Math" panose="02040503050406030204" pitchFamily="18" charset="0"/>
+                                    <a:latin typeface="Cambria Math"/>
                                   </a:rPr>
                                 </m:ctrlPr>
                               </m:sSubPr>
@@ -17323,7 +17193,7 @@
                               <m:funcPr>
                                 <m:ctrlPr>
                                   <a:rPr lang="en-US" i="1">
-                                    <a:latin typeface="Cambria Math" panose="02040503050406030204" pitchFamily="18" charset="0"/>
+                                    <a:latin typeface="Cambria Math"/>
                                   </a:rPr>
                                 </m:ctrlPr>
                               </m:funcPr>
@@ -17343,7 +17213,7 @@
                                   <m:dPr>
                                     <m:ctrlPr>
                                       <a:rPr lang="en-US" i="1">
-                                        <a:latin typeface="Cambria Math" panose="02040503050406030204" pitchFamily="18" charset="0"/>
+                                        <a:latin typeface="Cambria Math"/>
                                       </a:rPr>
                                     </m:ctrlPr>
                                   </m:dPr>
@@ -17352,7 +17222,7 @@
                                       <m:sSubPr>
                                         <m:ctrlPr>
                                           <a:rPr lang="en-US" i="1">
-                                            <a:latin typeface="Cambria Math" panose="02040503050406030204" pitchFamily="18" charset="0"/>
+                                            <a:latin typeface="Cambria Math"/>
                                           </a:rPr>
                                         </m:ctrlPr>
                                       </m:sSubPr>
@@ -17395,7 +17265,7 @@
                                       <m:sSubPr>
                                         <m:ctrlPr>
                                           <a:rPr lang="en-US" i="1">
-                                            <a:latin typeface="Cambria Math" panose="02040503050406030204" pitchFamily="18" charset="0"/>
+                                            <a:latin typeface="Cambria Math"/>
                                           </a:rPr>
                                         </m:ctrlPr>
                                       </m:sSubPr>
@@ -17462,7 +17332,7 @@
                               <m:sSubPr>
                                 <m:ctrlPr>
                                   <a:rPr lang="en-US" i="1">
-                                    <a:latin typeface="Cambria Math" panose="02040503050406030204" pitchFamily="18" charset="0"/>
+                                    <a:latin typeface="Cambria Math"/>
                                   </a:rPr>
                                 </m:ctrlPr>
                               </m:sSubPr>
@@ -17493,7 +17363,7 @@
                               <m:sSubPr>
                                 <m:ctrlPr>
                                   <a:rPr lang="en-US" i="1">
-                                    <a:latin typeface="Cambria Math" panose="02040503050406030204" pitchFamily="18" charset="0"/>
+                                    <a:latin typeface="Cambria Math"/>
                                   </a:rPr>
                                 </m:ctrlPr>
                               </m:sSubPr>
@@ -17594,7 +17464,7 @@
                       <m:sSubPr>
                         <m:ctrlPr>
                           <a:rPr lang="en-US" i="1" smtClean="0">
-                            <a:latin typeface="Cambria Math" panose="02040503050406030204" pitchFamily="18" charset="0"/>
+                            <a:latin typeface="Cambria Math"/>
                           </a:rPr>
                         </m:ctrlPr>
                       </m:sSubPr>
@@ -19441,7 +19311,7 @@
   <a:extraClrSchemeLst/>
   <a:extLst>
     <a:ext uri="{05A4C25C-085E-4340-85A3-A5531E510DB2}">
-      <thm15:themeFamily xmlns:thm15="http://schemas.microsoft.com/office/thememl/2012/main" name="Wisp" id="{7CB32D59-10C0-40DD-B7BD-2E94284A981C}" vid="{24B1A44C-C006-48B2-A4D7-E5549B3D8CD4}"/>
+      <thm15:themeFamily xmlns:thm15="http://schemas.microsoft.com/office/thememl/2012/main" xmlns="" name="Wisp" id="{7CB32D59-10C0-40DD-B7BD-2E94284A981C}" vid="{24B1A44C-C006-48B2-A4D7-E5549B3D8CD4}"/>
     </a:ext>
   </a:extLst>
 </a:theme>

</xml_diff>